<commit_message>
still slightly over 10 pages
</commit_message>
<xml_diff>
--- a/tech-reports/paper/figs/images.pptx
+++ b/tech-reports/paper/figs/images.pptx
@@ -299,7 +299,7 @@
           <a:p>
             <a:fld id="{06D27FD6-7394-0F44-B86B-46BBC2D874F2}" type="datetimeFigureOut">
               <a:rPr lang="en-US" smtClean="0"/>
-              <a:t>2/2/15</a:t>
+              <a:t>8/15/15</a:t>
             </a:fld>
             <a:endParaRPr lang="en-US"/>
           </a:p>
@@ -469,7 +469,7 @@
           <a:p>
             <a:fld id="{06D27FD6-7394-0F44-B86B-46BBC2D874F2}" type="datetimeFigureOut">
               <a:rPr lang="en-US" smtClean="0"/>
-              <a:t>2/2/15</a:t>
+              <a:t>8/15/15</a:t>
             </a:fld>
             <a:endParaRPr lang="en-US"/>
           </a:p>
@@ -649,7 +649,7 @@
           <a:p>
             <a:fld id="{06D27FD6-7394-0F44-B86B-46BBC2D874F2}" type="datetimeFigureOut">
               <a:rPr lang="en-US" smtClean="0"/>
-              <a:t>2/2/15</a:t>
+              <a:t>8/15/15</a:t>
             </a:fld>
             <a:endParaRPr lang="en-US"/>
           </a:p>
@@ -819,7 +819,7 @@
           <a:p>
             <a:fld id="{06D27FD6-7394-0F44-B86B-46BBC2D874F2}" type="datetimeFigureOut">
               <a:rPr lang="en-US" smtClean="0"/>
-              <a:t>2/2/15</a:t>
+              <a:t>8/15/15</a:t>
             </a:fld>
             <a:endParaRPr lang="en-US"/>
           </a:p>
@@ -1065,7 +1065,7 @@
           <a:p>
             <a:fld id="{06D27FD6-7394-0F44-B86B-46BBC2D874F2}" type="datetimeFigureOut">
               <a:rPr lang="en-US" smtClean="0"/>
-              <a:t>2/2/15</a:t>
+              <a:t>8/15/15</a:t>
             </a:fld>
             <a:endParaRPr lang="en-US"/>
           </a:p>
@@ -1353,7 +1353,7 @@
           <a:p>
             <a:fld id="{06D27FD6-7394-0F44-B86B-46BBC2D874F2}" type="datetimeFigureOut">
               <a:rPr lang="en-US" smtClean="0"/>
-              <a:t>2/2/15</a:t>
+              <a:t>8/15/15</a:t>
             </a:fld>
             <a:endParaRPr lang="en-US"/>
           </a:p>
@@ -1775,7 +1775,7 @@
           <a:p>
             <a:fld id="{06D27FD6-7394-0F44-B86B-46BBC2D874F2}" type="datetimeFigureOut">
               <a:rPr lang="en-US" smtClean="0"/>
-              <a:t>2/2/15</a:t>
+              <a:t>8/15/15</a:t>
             </a:fld>
             <a:endParaRPr lang="en-US"/>
           </a:p>
@@ -1893,7 +1893,7 @@
           <a:p>
             <a:fld id="{06D27FD6-7394-0F44-B86B-46BBC2D874F2}" type="datetimeFigureOut">
               <a:rPr lang="en-US" smtClean="0"/>
-              <a:t>2/2/15</a:t>
+              <a:t>8/15/15</a:t>
             </a:fld>
             <a:endParaRPr lang="en-US"/>
           </a:p>
@@ -1988,7 +1988,7 @@
           <a:p>
             <a:fld id="{06D27FD6-7394-0F44-B86B-46BBC2D874F2}" type="datetimeFigureOut">
               <a:rPr lang="en-US" smtClean="0"/>
-              <a:t>2/2/15</a:t>
+              <a:t>8/15/15</a:t>
             </a:fld>
             <a:endParaRPr lang="en-US"/>
           </a:p>
@@ -2265,7 +2265,7 @@
           <a:p>
             <a:fld id="{06D27FD6-7394-0F44-B86B-46BBC2D874F2}" type="datetimeFigureOut">
               <a:rPr lang="en-US" smtClean="0"/>
-              <a:t>2/2/15</a:t>
+              <a:t>8/15/15</a:t>
             </a:fld>
             <a:endParaRPr lang="en-US"/>
           </a:p>
@@ -2518,7 +2518,7 @@
           <a:p>
             <a:fld id="{06D27FD6-7394-0F44-B86B-46BBC2D874F2}" type="datetimeFigureOut">
               <a:rPr lang="en-US" smtClean="0"/>
-              <a:t>2/2/15</a:t>
+              <a:t>8/15/15</a:t>
             </a:fld>
             <a:endParaRPr lang="en-US"/>
           </a:p>
@@ -2731,7 +2731,7 @@
           <a:p>
             <a:fld id="{06D27FD6-7394-0F44-B86B-46BBC2D874F2}" type="datetimeFigureOut">
               <a:rPr lang="en-US" smtClean="0"/>
-              <a:t>2/2/15</a:t>
+              <a:t>8/15/15</a:t>
             </a:fld>
             <a:endParaRPr lang="en-US"/>
           </a:p>
@@ -7222,10 +7222,10 @@
         </p:nvGrpSpPr>
         <p:grpSpPr>
           <a:xfrm>
-            <a:off x="879262" y="1200151"/>
-            <a:ext cx="9304732" cy="5749556"/>
-            <a:chOff x="3537545" y="2605266"/>
-            <a:chExt cx="6646453" cy="4344440"/>
+            <a:off x="1151779" y="1200151"/>
+            <a:ext cx="8757603" cy="5749556"/>
+            <a:chOff x="3928364" y="2605266"/>
+            <a:chExt cx="6255634" cy="4344440"/>
           </a:xfrm>
         </p:grpSpPr>
         <p:sp>
@@ -7277,15 +7277,13 @@
         <p:cxnSp>
           <p:nvCxnSpPr>
             <p:cNvPr id="6" name="Straight Arrow Connector 5"/>
-            <p:cNvCxnSpPr>
-              <a:endCxn id="13" idx="1"/>
-            </p:cNvCxnSpPr>
+            <p:cNvCxnSpPr/>
             <p:nvPr/>
           </p:nvCxnSpPr>
           <p:spPr>
-            <a:xfrm flipV="1">
-              <a:off x="4237295" y="4795891"/>
-              <a:ext cx="395713" cy="19907"/>
+            <a:xfrm>
+              <a:off x="4334395" y="4786086"/>
+              <a:ext cx="298614" cy="0"/>
             </a:xfrm>
             <a:prstGeom prst="straightConnector1">
               <a:avLst/>
@@ -7330,48 +7328,14 @@
           </p:blipFill>
           <p:spPr>
             <a:xfrm>
-              <a:off x="3866529" y="4304871"/>
-              <a:ext cx="530278" cy="773734"/>
+              <a:off x="3928364" y="4450693"/>
+              <a:ext cx="406031" cy="592445"/>
             </a:xfrm>
             <a:prstGeom prst="rect">
               <a:avLst/>
             </a:prstGeom>
           </p:spPr>
         </p:pic>
-        <p:sp>
-          <p:nvSpPr>
-            <p:cNvPr id="9" name="TextBox 8"/>
-            <p:cNvSpPr txBox="1"/>
-            <p:nvPr/>
-          </p:nvSpPr>
-          <p:spPr>
-            <a:xfrm>
-              <a:off x="3537545" y="5140289"/>
-              <a:ext cx="1295998" cy="348840"/>
-            </a:xfrm>
-            <a:prstGeom prst="rect">
-              <a:avLst/>
-            </a:prstGeom>
-            <a:noFill/>
-            <a:ln>
-              <a:noFill/>
-            </a:ln>
-          </p:spPr>
-          <p:txBody>
-            <a:bodyPr wrap="square" rtlCol="0">
-              <a:spAutoFit/>
-            </a:bodyPr>
-            <a:lstStyle/>
-            <a:p>
-              <a:pPr algn="ctr"/>
-              <a:r>
-                <a:rPr lang="en-US" sz="2400" i="1" dirty="0" smtClean="0"/>
-                <a:t>Webserver</a:t>
-              </a:r>
-              <a:endParaRPr lang="en-US" sz="2400" i="1" dirty="0"/>
-            </a:p>
-          </p:txBody>
-        </p:sp>
         <p:cxnSp>
           <p:nvCxnSpPr>
             <p:cNvPr id="14" name="Straight Arrow Connector 13"/>
@@ -7383,7 +7347,7 @@
           </p:nvCxnSpPr>
           <p:spPr>
             <a:xfrm flipV="1">
-              <a:off x="5336399" y="3734992"/>
+              <a:off x="5336398" y="3734992"/>
               <a:ext cx="703390" cy="746943"/>
             </a:xfrm>
             <a:prstGeom prst="straightConnector1">
@@ -7434,6 +7398,7 @@
               <a:solidFill>
                 <a:srgbClr val="FF0000"/>
               </a:solidFill>
+              <a:headEnd type="none"/>
               <a:tailEnd type="arrow"/>
             </a:ln>
             <a:effectLst/>
@@ -7617,6 +7582,7 @@
               <a:solidFill>
                 <a:srgbClr val="FF0000"/>
               </a:solidFill>
+              <a:headEnd type="arrow"/>
               <a:tailEnd type="arrow"/>
             </a:ln>
             <a:effectLst/>
@@ -7684,7 +7650,7 @@
           </p:nvSpPr>
           <p:spPr>
             <a:xfrm>
-              <a:off x="8777218" y="5128266"/>
+              <a:off x="8777218" y="5302685"/>
               <a:ext cx="1406780" cy="348840"/>
             </a:xfrm>
             <a:prstGeom prst="rect">
@@ -7770,7 +7736,7 @@
           </p:blipFill>
           <p:spPr>
             <a:xfrm>
-              <a:off x="9125856" y="4236154"/>
+              <a:off x="9125856" y="4363700"/>
               <a:ext cx="730843" cy="973178"/>
             </a:xfrm>
             <a:prstGeom prst="rect">
@@ -7804,17 +7770,17 @@
             <a:p>
               <a:pPr algn="ctr"/>
               <a:r>
-                <a:rPr lang="en-US" sz="2400" dirty="0" smtClean="0"/>
+                <a:rPr lang="en-US" sz="2400" i="1" dirty="0" smtClean="0"/>
                 <a:t>Live </a:t>
               </a:r>
             </a:p>
             <a:p>
               <a:pPr algn="ctr"/>
               <a:r>
-                <a:rPr lang="en-US" sz="2400" dirty="0" smtClean="0"/>
+                <a:rPr lang="en-US" sz="2400" i="1" dirty="0" smtClean="0"/>
                 <a:t>Cloning</a:t>
               </a:r>
-              <a:endParaRPr lang="en-US" sz="2400" dirty="0"/>
+              <a:endParaRPr lang="en-US" sz="2400" i="1" dirty="0"/>
             </a:p>
           </p:txBody>
         </p:sp>
@@ -8006,254 +7972,1794 @@
       </p:grpSpPr>
       <p:grpSp>
         <p:nvGrpSpPr>
-          <p:cNvPr id="5" name="Group 4"/>
+          <p:cNvPr id="8" name="Group 7"/>
           <p:cNvGrpSpPr/>
           <p:nvPr/>
         </p:nvGrpSpPr>
         <p:grpSpPr>
           <a:xfrm>
-            <a:off x="1008192" y="1368791"/>
-            <a:ext cx="3614862" cy="5048122"/>
-            <a:chOff x="720137" y="977707"/>
-            <a:chExt cx="2582044" cy="3605801"/>
+            <a:off x="1008192" y="561535"/>
+            <a:ext cx="7598013" cy="5855378"/>
+            <a:chOff x="1008192" y="561535"/>
+            <a:chExt cx="7598013" cy="5855378"/>
           </a:xfrm>
         </p:grpSpPr>
-        <p:sp>
-          <p:nvSpPr>
-            <p:cNvPr id="7" name="Rounded Rectangle 6"/>
-            <p:cNvSpPr/>
-            <p:nvPr/>
-          </p:nvSpPr>
-          <p:spPr>
+        <p:grpSp>
+          <p:nvGrpSpPr>
+            <p:cNvPr id="5" name="Group 4"/>
+            <p:cNvGrpSpPr/>
+            <p:nvPr/>
+          </p:nvGrpSpPr>
+          <p:grpSpPr>
             <a:xfrm>
-              <a:off x="720137" y="1921701"/>
-              <a:ext cx="1186725" cy="2000491"/>
-            </a:xfrm>
-            <a:prstGeom prst="roundRect">
-              <a:avLst>
-                <a:gd name="adj" fmla="val 7797"/>
-              </a:avLst>
-            </a:prstGeom>
-            <a:solidFill>
-              <a:schemeClr val="bg1">
-                <a:lumMod val="85000"/>
-              </a:schemeClr>
-            </a:solidFill>
-            <a:ln w="19050" cmpd="sng">
+              <a:off x="1008192" y="1368791"/>
+              <a:ext cx="3614862" cy="5048122"/>
+              <a:chOff x="720137" y="977707"/>
+              <a:chExt cx="2582044" cy="3605801"/>
+            </a:xfrm>
+          </p:grpSpPr>
+          <p:sp>
+            <p:nvSpPr>
+              <p:cNvPr id="7" name="Rounded Rectangle 6"/>
+              <p:cNvSpPr/>
+              <p:nvPr/>
+            </p:nvSpPr>
+            <p:spPr>
+              <a:xfrm>
+                <a:off x="720137" y="1921701"/>
+                <a:ext cx="1186725" cy="2000491"/>
+              </a:xfrm>
+              <a:prstGeom prst="roundRect">
+                <a:avLst>
+                  <a:gd name="adj" fmla="val 7797"/>
+                </a:avLst>
+              </a:prstGeom>
+              <a:solidFill>
+                <a:schemeClr val="bg1">
+                  <a:lumMod val="85000"/>
+                </a:schemeClr>
+              </a:solidFill>
+              <a:ln w="19050" cmpd="sng">
+                <a:solidFill>
+                  <a:schemeClr val="tx1"/>
+                </a:solidFill>
+              </a:ln>
+              <a:effectLst/>
+            </p:spPr>
+            <p:style>
+              <a:lnRef idx="1">
+                <a:schemeClr val="accent1"/>
+              </a:lnRef>
+              <a:fillRef idx="3">
+                <a:schemeClr val="accent1"/>
+              </a:fillRef>
+              <a:effectRef idx="2">
+                <a:schemeClr val="accent1"/>
+              </a:effectRef>
+              <a:fontRef idx="minor">
+                <a:schemeClr val="lt1"/>
+              </a:fontRef>
+            </p:style>
+            <p:txBody>
+              <a:bodyPr anchor="ctr"/>
+              <a:lstStyle/>
+              <a:p>
+                <a:pPr algn="ctr">
+                  <a:defRPr/>
+                </a:pPr>
+                <a:endParaRPr lang="en-US">
+                  <a:solidFill>
+                    <a:srgbClr val="FFFFFF"/>
+                  </a:solidFill>
+                  <a:latin typeface="Arial"/>
+                  <a:ea typeface="ＭＳ Ｐゴシック"/>
+                </a:endParaRPr>
+              </a:p>
+            </p:txBody>
+          </p:sp>
+          <p:sp>
+            <p:nvSpPr>
+              <p:cNvPr id="27" name="Rounded Rectangle 26"/>
+              <p:cNvSpPr/>
+              <p:nvPr/>
+            </p:nvSpPr>
+            <p:spPr>
+              <a:xfrm>
+                <a:off x="851301" y="2584743"/>
+                <a:ext cx="909460" cy="831737"/>
+              </a:xfrm>
+              <a:prstGeom prst="roundRect">
+                <a:avLst/>
+              </a:prstGeom>
+              <a:solidFill>
+                <a:srgbClr val="FF6600"/>
+              </a:solidFill>
+              <a:ln w="19050">
+                <a:solidFill>
+                  <a:srgbClr val="000000"/>
+                </a:solidFill>
+              </a:ln>
+              <a:effectLst/>
+            </p:spPr>
+            <p:style>
+              <a:lnRef idx="1">
+                <a:schemeClr val="accent1"/>
+              </a:lnRef>
+              <a:fillRef idx="3">
+                <a:schemeClr val="accent1"/>
+              </a:fillRef>
+              <a:effectRef idx="2">
+                <a:schemeClr val="accent1"/>
+              </a:effectRef>
+              <a:fontRef idx="minor">
+                <a:schemeClr val="lt1"/>
+              </a:fontRef>
+            </p:style>
+            <p:txBody>
+              <a:bodyPr anchor="ctr"/>
+              <a:lstStyle>
+                <a:lvl1pPr>
+                  <a:defRPr>
+                    <a:solidFill>
+                      <a:schemeClr val="lt1"/>
+                    </a:solidFill>
+                    <a:latin typeface="+mn-lt"/>
+                    <a:ea typeface="+mn-ea"/>
+                    <a:cs typeface="+mn-cs"/>
+                  </a:defRPr>
+                </a:lvl1pPr>
+                <a:lvl2pPr>
+                  <a:defRPr>
+                    <a:solidFill>
+                      <a:schemeClr val="lt1"/>
+                    </a:solidFill>
+                    <a:latin typeface="+mn-lt"/>
+                    <a:ea typeface="+mn-ea"/>
+                    <a:cs typeface="+mn-cs"/>
+                  </a:defRPr>
+                </a:lvl2pPr>
+                <a:lvl3pPr>
+                  <a:defRPr>
+                    <a:solidFill>
+                      <a:schemeClr val="lt1"/>
+                    </a:solidFill>
+                    <a:latin typeface="+mn-lt"/>
+                    <a:ea typeface="+mn-ea"/>
+                    <a:cs typeface="+mn-cs"/>
+                  </a:defRPr>
+                </a:lvl3pPr>
+                <a:lvl4pPr>
+                  <a:defRPr>
+                    <a:solidFill>
+                      <a:schemeClr val="lt1"/>
+                    </a:solidFill>
+                    <a:latin typeface="+mn-lt"/>
+                    <a:ea typeface="+mn-ea"/>
+                    <a:cs typeface="+mn-cs"/>
+                  </a:defRPr>
+                </a:lvl4pPr>
+                <a:lvl5pPr>
+                  <a:defRPr>
+                    <a:solidFill>
+                      <a:schemeClr val="lt1"/>
+                    </a:solidFill>
+                    <a:latin typeface="+mn-lt"/>
+                    <a:ea typeface="+mn-ea"/>
+                    <a:cs typeface="+mn-cs"/>
+                  </a:defRPr>
+                </a:lvl5pPr>
+                <a:lvl6pPr>
+                  <a:defRPr>
+                    <a:solidFill>
+                      <a:schemeClr val="lt1"/>
+                    </a:solidFill>
+                    <a:latin typeface="+mn-lt"/>
+                    <a:ea typeface="+mn-ea"/>
+                    <a:cs typeface="+mn-cs"/>
+                  </a:defRPr>
+                </a:lvl6pPr>
+                <a:lvl7pPr>
+                  <a:defRPr>
+                    <a:solidFill>
+                      <a:schemeClr val="lt1"/>
+                    </a:solidFill>
+                    <a:latin typeface="+mn-lt"/>
+                    <a:ea typeface="+mn-ea"/>
+                    <a:cs typeface="+mn-cs"/>
+                  </a:defRPr>
+                </a:lvl7pPr>
+                <a:lvl8pPr>
+                  <a:defRPr>
+                    <a:solidFill>
+                      <a:schemeClr val="lt1"/>
+                    </a:solidFill>
+                    <a:latin typeface="+mn-lt"/>
+                    <a:ea typeface="+mn-ea"/>
+                    <a:cs typeface="+mn-cs"/>
+                  </a:defRPr>
+                </a:lvl8pPr>
+                <a:lvl9pPr>
+                  <a:defRPr>
+                    <a:solidFill>
+                      <a:schemeClr val="lt1"/>
+                    </a:solidFill>
+                    <a:latin typeface="+mn-lt"/>
+                    <a:ea typeface="+mn-ea"/>
+                    <a:cs typeface="+mn-cs"/>
+                  </a:defRPr>
+                </a:lvl9pPr>
+              </a:lstStyle>
+              <a:p>
+                <a:pPr algn="ctr">
+                  <a:defRPr/>
+                </a:pPr>
+                <a:r>
+                  <a:rPr lang="en-US" sz="3200" b="1" kern="1200" dirty="0" smtClean="0">
+                    <a:solidFill>
+                      <a:srgbClr val="000000"/>
+                    </a:solidFill>
+                    <a:latin typeface="Arial"/>
+                    <a:ea typeface="ＭＳ Ｐゴシック"/>
+                  </a:rPr>
+                  <a:t>P1</a:t>
+                </a:r>
+                <a:endParaRPr lang="en-US" b="1" kern="1200" dirty="0">
+                  <a:solidFill>
+                    <a:srgbClr val="000000"/>
+                  </a:solidFill>
+                  <a:latin typeface="Arial"/>
+                  <a:ea typeface="ＭＳ Ｐゴシック"/>
+                </a:endParaRPr>
+              </a:p>
+            </p:txBody>
+          </p:sp>
+          <p:sp>
+            <p:nvSpPr>
+              <p:cNvPr id="3" name="Rectangle 2"/>
+              <p:cNvSpPr/>
+              <p:nvPr/>
+            </p:nvSpPr>
+            <p:spPr>
+              <a:xfrm>
+                <a:off x="851301" y="3528861"/>
+                <a:ext cx="909460" cy="280951"/>
+              </a:xfrm>
+              <a:prstGeom prst="rect">
+                <a:avLst/>
+              </a:prstGeom>
+              <a:solidFill>
+                <a:srgbClr val="CCFFCC"/>
+              </a:solidFill>
+              <a:ln w="19050">
+                <a:solidFill>
+                  <a:schemeClr val="tx1"/>
+                </a:solidFill>
+              </a:ln>
+              <a:effectLst/>
+            </p:spPr>
+            <p:style>
+              <a:lnRef idx="1">
+                <a:schemeClr val="accent1"/>
+              </a:lnRef>
+              <a:fillRef idx="3">
+                <a:schemeClr val="accent1"/>
+              </a:fillRef>
+              <a:effectRef idx="2">
+                <a:schemeClr val="accent1"/>
+              </a:effectRef>
+              <a:fontRef idx="minor">
+                <a:schemeClr val="lt1"/>
+              </a:fontRef>
+            </p:style>
+            <p:txBody>
+              <a:bodyPr rtlCol="0" anchor="ctr"/>
+              <a:lstStyle/>
+              <a:p>
+                <a:pPr algn="ctr"/>
+                <a:r>
+                  <a:rPr lang="en-US" sz="3200" b="1" dirty="0" smtClean="0">
+                    <a:solidFill>
+                      <a:schemeClr val="tx1"/>
+                    </a:solidFill>
+                  </a:rPr>
+                  <a:t>NAT</a:t>
+                </a:r>
+                <a:endParaRPr lang="en-US" sz="3200" b="1" dirty="0">
+                  <a:solidFill>
+                    <a:schemeClr val="tx1"/>
+                  </a:solidFill>
+                </a:endParaRPr>
+              </a:p>
+            </p:txBody>
+          </p:sp>
+          <p:sp>
+            <p:nvSpPr>
+              <p:cNvPr id="31" name="Rounded Rectangle 30"/>
+              <p:cNvSpPr/>
+              <p:nvPr/>
+            </p:nvSpPr>
+            <p:spPr>
+              <a:xfrm>
+                <a:off x="2115456" y="1921701"/>
+                <a:ext cx="1186725" cy="1989253"/>
+              </a:xfrm>
+              <a:prstGeom prst="roundRect">
+                <a:avLst>
+                  <a:gd name="adj" fmla="val 7797"/>
+                </a:avLst>
+              </a:prstGeom>
+              <a:solidFill>
+                <a:schemeClr val="bg1">
+                  <a:lumMod val="85000"/>
+                </a:schemeClr>
+              </a:solidFill>
+              <a:ln w="19050" cmpd="sng">
+                <a:solidFill>
+                  <a:schemeClr val="tx1"/>
+                </a:solidFill>
+              </a:ln>
+              <a:effectLst/>
+            </p:spPr>
+            <p:style>
+              <a:lnRef idx="1">
+                <a:schemeClr val="accent1"/>
+              </a:lnRef>
+              <a:fillRef idx="3">
+                <a:schemeClr val="accent1"/>
+              </a:fillRef>
+              <a:effectRef idx="2">
+                <a:schemeClr val="accent1"/>
+              </a:effectRef>
+              <a:fontRef idx="minor">
+                <a:schemeClr val="lt1"/>
+              </a:fontRef>
+            </p:style>
+            <p:txBody>
+              <a:bodyPr anchor="ctr"/>
+              <a:lstStyle/>
+              <a:p>
+                <a:pPr algn="ctr">
+                  <a:defRPr/>
+                </a:pPr>
+                <a:endParaRPr lang="en-US">
+                  <a:solidFill>
+                    <a:srgbClr val="FFFFFF"/>
+                  </a:solidFill>
+                  <a:latin typeface="Arial"/>
+                  <a:ea typeface="ＭＳ Ｐゴシック"/>
+                </a:endParaRPr>
+              </a:p>
+            </p:txBody>
+          </p:sp>
+          <p:sp>
+            <p:nvSpPr>
+              <p:cNvPr id="32" name="Rounded Rectangle 31"/>
+              <p:cNvSpPr/>
+              <p:nvPr/>
+            </p:nvSpPr>
+            <p:spPr>
+              <a:xfrm>
+                <a:off x="2246620" y="2584743"/>
+                <a:ext cx="909460" cy="820500"/>
+              </a:xfrm>
+              <a:prstGeom prst="roundRect">
+                <a:avLst/>
+              </a:prstGeom>
+              <a:solidFill>
+                <a:srgbClr val="FF6600"/>
+              </a:solidFill>
+              <a:ln w="19050">
+                <a:solidFill>
+                  <a:srgbClr val="000000"/>
+                </a:solidFill>
+              </a:ln>
+              <a:effectLst/>
+            </p:spPr>
+            <p:style>
+              <a:lnRef idx="1">
+                <a:schemeClr val="accent1"/>
+              </a:lnRef>
+              <a:fillRef idx="3">
+                <a:schemeClr val="accent1"/>
+              </a:fillRef>
+              <a:effectRef idx="2">
+                <a:schemeClr val="accent1"/>
+              </a:effectRef>
+              <a:fontRef idx="minor">
+                <a:schemeClr val="lt1"/>
+              </a:fontRef>
+            </p:style>
+            <p:txBody>
+              <a:bodyPr anchor="ctr"/>
+              <a:lstStyle>
+                <a:lvl1pPr>
+                  <a:defRPr>
+                    <a:solidFill>
+                      <a:schemeClr val="lt1"/>
+                    </a:solidFill>
+                    <a:latin typeface="+mn-lt"/>
+                    <a:ea typeface="+mn-ea"/>
+                    <a:cs typeface="+mn-cs"/>
+                  </a:defRPr>
+                </a:lvl1pPr>
+                <a:lvl2pPr>
+                  <a:defRPr>
+                    <a:solidFill>
+                      <a:schemeClr val="lt1"/>
+                    </a:solidFill>
+                    <a:latin typeface="+mn-lt"/>
+                    <a:ea typeface="+mn-ea"/>
+                    <a:cs typeface="+mn-cs"/>
+                  </a:defRPr>
+                </a:lvl2pPr>
+                <a:lvl3pPr>
+                  <a:defRPr>
+                    <a:solidFill>
+                      <a:schemeClr val="lt1"/>
+                    </a:solidFill>
+                    <a:latin typeface="+mn-lt"/>
+                    <a:ea typeface="+mn-ea"/>
+                    <a:cs typeface="+mn-cs"/>
+                  </a:defRPr>
+                </a:lvl3pPr>
+                <a:lvl4pPr>
+                  <a:defRPr>
+                    <a:solidFill>
+                      <a:schemeClr val="lt1"/>
+                    </a:solidFill>
+                    <a:latin typeface="+mn-lt"/>
+                    <a:ea typeface="+mn-ea"/>
+                    <a:cs typeface="+mn-cs"/>
+                  </a:defRPr>
+                </a:lvl4pPr>
+                <a:lvl5pPr>
+                  <a:defRPr>
+                    <a:solidFill>
+                      <a:schemeClr val="lt1"/>
+                    </a:solidFill>
+                    <a:latin typeface="+mn-lt"/>
+                    <a:ea typeface="+mn-ea"/>
+                    <a:cs typeface="+mn-cs"/>
+                  </a:defRPr>
+                </a:lvl5pPr>
+                <a:lvl6pPr>
+                  <a:defRPr>
+                    <a:solidFill>
+                      <a:schemeClr val="lt1"/>
+                    </a:solidFill>
+                    <a:latin typeface="+mn-lt"/>
+                    <a:ea typeface="+mn-ea"/>
+                    <a:cs typeface="+mn-cs"/>
+                  </a:defRPr>
+                </a:lvl6pPr>
+                <a:lvl7pPr>
+                  <a:defRPr>
+                    <a:solidFill>
+                      <a:schemeClr val="lt1"/>
+                    </a:solidFill>
+                    <a:latin typeface="+mn-lt"/>
+                    <a:ea typeface="+mn-ea"/>
+                    <a:cs typeface="+mn-cs"/>
+                  </a:defRPr>
+                </a:lvl7pPr>
+                <a:lvl8pPr>
+                  <a:defRPr>
+                    <a:solidFill>
+                      <a:schemeClr val="lt1"/>
+                    </a:solidFill>
+                    <a:latin typeface="+mn-lt"/>
+                    <a:ea typeface="+mn-ea"/>
+                    <a:cs typeface="+mn-cs"/>
+                  </a:defRPr>
+                </a:lvl8pPr>
+                <a:lvl9pPr>
+                  <a:defRPr>
+                    <a:solidFill>
+                      <a:schemeClr val="lt1"/>
+                    </a:solidFill>
+                    <a:latin typeface="+mn-lt"/>
+                    <a:ea typeface="+mn-ea"/>
+                    <a:cs typeface="+mn-cs"/>
+                  </a:defRPr>
+                </a:lvl9pPr>
+              </a:lstStyle>
+              <a:p>
+                <a:pPr algn="ctr">
+                  <a:defRPr/>
+                </a:pPr>
+                <a:r>
+                  <a:rPr lang="en-US" sz="3200" b="1" dirty="0">
+                    <a:solidFill>
+                      <a:srgbClr val="000000"/>
+                    </a:solidFill>
+                    <a:latin typeface="Arial"/>
+                    <a:ea typeface="ＭＳ Ｐゴシック"/>
+                  </a:rPr>
+                  <a:t>D</a:t>
+                </a:r>
+                <a:r>
+                  <a:rPr lang="en-US" sz="3200" b="1" dirty="0" smtClean="0">
+                    <a:solidFill>
+                      <a:srgbClr val="000000"/>
+                    </a:solidFill>
+                    <a:latin typeface="Arial"/>
+                    <a:ea typeface="ＭＳ Ｐゴシック"/>
+                  </a:rPr>
+                  <a:t>1</a:t>
+                </a:r>
+                <a:endParaRPr lang="en-US" b="1" kern="1200" dirty="0">
+                  <a:solidFill>
+                    <a:srgbClr val="000000"/>
+                  </a:solidFill>
+                  <a:latin typeface="Arial"/>
+                  <a:ea typeface="ＭＳ Ｐゴシック"/>
+                </a:endParaRPr>
+              </a:p>
+            </p:txBody>
+          </p:sp>
+          <p:sp>
+            <p:nvSpPr>
+              <p:cNvPr id="33" name="Rectangle 32"/>
+              <p:cNvSpPr/>
+              <p:nvPr/>
+            </p:nvSpPr>
+            <p:spPr>
+              <a:xfrm>
+                <a:off x="2246620" y="3517623"/>
+                <a:ext cx="909460" cy="280951"/>
+              </a:xfrm>
+              <a:prstGeom prst="rect">
+                <a:avLst/>
+              </a:prstGeom>
+              <a:solidFill>
+                <a:srgbClr val="CCFFCC"/>
+              </a:solidFill>
+              <a:ln w="19050">
+                <a:solidFill>
+                  <a:schemeClr val="tx1"/>
+                </a:solidFill>
+              </a:ln>
+              <a:effectLst/>
+            </p:spPr>
+            <p:style>
+              <a:lnRef idx="1">
+                <a:schemeClr val="accent1"/>
+              </a:lnRef>
+              <a:fillRef idx="3">
+                <a:schemeClr val="accent1"/>
+              </a:fillRef>
+              <a:effectRef idx="2">
+                <a:schemeClr val="accent1"/>
+              </a:effectRef>
+              <a:fontRef idx="minor">
+                <a:schemeClr val="lt1"/>
+              </a:fontRef>
+            </p:style>
+            <p:txBody>
+              <a:bodyPr rtlCol="0" anchor="ctr"/>
+              <a:lstStyle/>
+              <a:p>
+                <a:pPr algn="ctr"/>
+                <a:r>
+                  <a:rPr lang="en-US" sz="3200" b="1" dirty="0" smtClean="0">
+                    <a:solidFill>
+                      <a:schemeClr val="tx1"/>
+                    </a:solidFill>
+                  </a:rPr>
+                  <a:t>NAT</a:t>
+                </a:r>
+                <a:endParaRPr lang="en-US" b="1" dirty="0">
+                  <a:solidFill>
+                    <a:schemeClr val="tx1"/>
+                  </a:solidFill>
+                </a:endParaRPr>
+              </a:p>
+            </p:txBody>
+          </p:sp>
+          <p:sp>
+            <p:nvSpPr>
+              <p:cNvPr id="4" name="Rectangle 3"/>
+              <p:cNvSpPr/>
+              <p:nvPr/>
+            </p:nvSpPr>
+            <p:spPr>
+              <a:xfrm>
+                <a:off x="851301" y="977707"/>
+                <a:ext cx="2304779" cy="606853"/>
+              </a:xfrm>
+              <a:prstGeom prst="rect">
+                <a:avLst/>
+              </a:prstGeom>
+              <a:solidFill>
+                <a:schemeClr val="accent5"/>
+              </a:solidFill>
+              <a:ln w="19050">
+                <a:solidFill>
+                  <a:schemeClr val="tx1"/>
+                </a:solidFill>
+              </a:ln>
+              <a:effectLst/>
+            </p:spPr>
+            <p:style>
+              <a:lnRef idx="1">
+                <a:schemeClr val="accent1"/>
+              </a:lnRef>
+              <a:fillRef idx="3">
+                <a:schemeClr val="accent1"/>
+              </a:fillRef>
+              <a:effectRef idx="2">
+                <a:schemeClr val="accent1"/>
+              </a:effectRef>
+              <a:fontRef idx="minor">
+                <a:schemeClr val="lt1"/>
+              </a:fontRef>
+            </p:style>
+            <p:txBody>
+              <a:bodyPr rtlCol="0" anchor="ctr"/>
+              <a:lstStyle/>
+              <a:p>
+                <a:pPr algn="ctr"/>
+                <a:r>
+                  <a:rPr lang="en-US" sz="3600" b="1" dirty="0" smtClean="0">
+                    <a:solidFill>
+                      <a:srgbClr val="000000"/>
+                    </a:solidFill>
+                  </a:rPr>
+                  <a:t>Clone Manager</a:t>
+                </a:r>
+                <a:endParaRPr lang="en-US" sz="3600" b="1" dirty="0">
+                  <a:solidFill>
+                    <a:srgbClr val="000000"/>
+                  </a:solidFill>
+                </a:endParaRPr>
+              </a:p>
+            </p:txBody>
+          </p:sp>
+          <p:cxnSp>
+            <p:nvCxnSpPr>
+              <p:cNvPr id="12" name="Straight Arrow Connector 11"/>
+              <p:cNvCxnSpPr>
+                <a:stCxn id="4" idx="2"/>
+                <a:endCxn id="7" idx="0"/>
+              </p:cNvCxnSpPr>
+              <p:nvPr/>
+            </p:nvCxnSpPr>
+            <p:spPr>
+              <a:xfrm flipH="1">
+                <a:off x="1313500" y="1584560"/>
+                <a:ext cx="690191" cy="337141"/>
+              </a:xfrm>
+              <a:prstGeom prst="straightConnector1">
+                <a:avLst/>
+              </a:prstGeom>
+              <a:ln w="19050">
+                <a:solidFill>
+                  <a:schemeClr val="tx1"/>
+                </a:solidFill>
+                <a:prstDash val="dash"/>
+                <a:tailEnd type="arrow"/>
+              </a:ln>
+              <a:effectLst/>
+            </p:spPr>
+            <p:style>
+              <a:lnRef idx="2">
+                <a:schemeClr val="accent1"/>
+              </a:lnRef>
+              <a:fillRef idx="0">
+                <a:schemeClr val="accent1"/>
+              </a:fillRef>
+              <a:effectRef idx="1">
+                <a:schemeClr val="accent1"/>
+              </a:effectRef>
+              <a:fontRef idx="minor">
+                <a:schemeClr val="tx1"/>
+              </a:fontRef>
+            </p:style>
+          </p:cxnSp>
+          <p:cxnSp>
+            <p:nvCxnSpPr>
+              <p:cNvPr id="40" name="Straight Arrow Connector 39"/>
+              <p:cNvCxnSpPr>
+                <a:stCxn id="4" idx="2"/>
+                <a:endCxn id="31" idx="0"/>
+              </p:cNvCxnSpPr>
+              <p:nvPr/>
+            </p:nvCxnSpPr>
+            <p:spPr>
+              <a:xfrm>
+                <a:off x="2003691" y="1584560"/>
+                <a:ext cx="705128" cy="337141"/>
+              </a:xfrm>
+              <a:prstGeom prst="straightConnector1">
+                <a:avLst/>
+              </a:prstGeom>
+              <a:ln w="19050">
+                <a:solidFill>
+                  <a:schemeClr val="tx1"/>
+                </a:solidFill>
+                <a:prstDash val="dash"/>
+                <a:tailEnd type="arrow"/>
+              </a:ln>
+              <a:effectLst/>
+            </p:spPr>
+            <p:style>
+              <a:lnRef idx="2">
+                <a:schemeClr val="accent1"/>
+              </a:lnRef>
+              <a:fillRef idx="0">
+                <a:schemeClr val="accent1"/>
+              </a:fillRef>
+              <a:effectRef idx="1">
+                <a:schemeClr val="accent1"/>
+              </a:effectRef>
+              <a:fontRef idx="minor">
+                <a:schemeClr val="tx1"/>
+              </a:fontRef>
+            </p:style>
+          </p:cxnSp>
+          <p:sp>
+            <p:nvSpPr>
+              <p:cNvPr id="23" name="Rectangle 22"/>
+              <p:cNvSpPr/>
+              <p:nvPr/>
+            </p:nvSpPr>
+            <p:spPr>
+              <a:xfrm>
+                <a:off x="811423" y="2034081"/>
+                <a:ext cx="982982" cy="370855"/>
+              </a:xfrm>
+              <a:prstGeom prst="rect">
+                <a:avLst/>
+              </a:prstGeom>
+              <a:solidFill>
+                <a:schemeClr val="tx2">
+                  <a:lumMod val="40000"/>
+                  <a:lumOff val="60000"/>
+                </a:schemeClr>
+              </a:solidFill>
+              <a:ln w="19050">
+                <a:solidFill>
+                  <a:schemeClr val="tx1"/>
+                </a:solidFill>
+              </a:ln>
+              <a:effectLst/>
+            </p:spPr>
+            <p:style>
+              <a:lnRef idx="1">
+                <a:schemeClr val="accent1"/>
+              </a:lnRef>
+              <a:fillRef idx="3">
+                <a:schemeClr val="accent1"/>
+              </a:fillRef>
+              <a:effectRef idx="2">
+                <a:schemeClr val="accent1"/>
+              </a:effectRef>
+              <a:fontRef idx="minor">
+                <a:schemeClr val="lt1"/>
+              </a:fontRef>
+            </p:style>
+            <p:txBody>
+              <a:bodyPr rtlCol="0" anchor="ctr"/>
+              <a:lstStyle/>
+              <a:p>
+                <a:pPr algn="ctr"/>
+                <a:r>
+                  <a:rPr lang="en-US" sz="3200" b="1" dirty="0" smtClean="0">
+                    <a:solidFill>
+                      <a:srgbClr val="000000"/>
+                    </a:solidFill>
+                  </a:rPr>
+                  <a:t>Agent</a:t>
+                </a:r>
+                <a:endParaRPr lang="en-US" sz="3200" b="1" dirty="0">
+                  <a:solidFill>
+                    <a:srgbClr val="000000"/>
+                  </a:solidFill>
+                </a:endParaRPr>
+              </a:p>
+            </p:txBody>
+          </p:sp>
+          <p:sp>
+            <p:nvSpPr>
+              <p:cNvPr id="52" name="Rectangle 51"/>
+              <p:cNvSpPr/>
+              <p:nvPr/>
+            </p:nvSpPr>
+            <p:spPr>
+              <a:xfrm>
+                <a:off x="2254089" y="2034081"/>
+                <a:ext cx="909460" cy="370855"/>
+              </a:xfrm>
+              <a:prstGeom prst="rect">
+                <a:avLst/>
+              </a:prstGeom>
+              <a:solidFill>
+                <a:schemeClr val="tx2">
+                  <a:lumMod val="40000"/>
+                  <a:lumOff val="60000"/>
+                </a:schemeClr>
+              </a:solidFill>
+              <a:ln w="19050">
+                <a:solidFill>
+                  <a:schemeClr val="tx1"/>
+                </a:solidFill>
+              </a:ln>
+              <a:effectLst/>
+            </p:spPr>
+            <p:style>
+              <a:lnRef idx="1">
+                <a:schemeClr val="accent1"/>
+              </a:lnRef>
+              <a:fillRef idx="3">
+                <a:schemeClr val="accent1"/>
+              </a:fillRef>
+              <a:effectRef idx="2">
+                <a:schemeClr val="accent1"/>
+              </a:effectRef>
+              <a:fontRef idx="minor">
+                <a:schemeClr val="lt1"/>
+              </a:fontRef>
+            </p:style>
+            <p:txBody>
+              <a:bodyPr rtlCol="0" anchor="ctr"/>
+              <a:lstStyle/>
+              <a:p>
+                <a:pPr algn="ctr"/>
+                <a:r>
+                  <a:rPr lang="en-US" sz="3200" b="1" dirty="0" smtClean="0">
+                    <a:solidFill>
+                      <a:srgbClr val="000000"/>
+                    </a:solidFill>
+                  </a:rPr>
+                  <a:t>Agent</a:t>
+                </a:r>
+                <a:endParaRPr lang="en-US" sz="3200" b="1" dirty="0">
+                  <a:solidFill>
+                    <a:srgbClr val="000000"/>
+                  </a:solidFill>
+                </a:endParaRPr>
+              </a:p>
+            </p:txBody>
+          </p:sp>
+          <p:cxnSp>
+            <p:nvCxnSpPr>
+              <p:cNvPr id="69" name="Straight Arrow Connector 68"/>
+              <p:cNvCxnSpPr/>
+              <p:nvPr/>
+            </p:nvCxnSpPr>
+            <p:spPr>
+              <a:xfrm>
+                <a:off x="1311460" y="3906022"/>
+                <a:ext cx="2040" cy="337141"/>
+              </a:xfrm>
+              <a:prstGeom prst="straightConnector1">
+                <a:avLst/>
+              </a:prstGeom>
+              <a:ln w="19050">
+                <a:solidFill>
+                  <a:schemeClr val="tx1"/>
+                </a:solidFill>
+                <a:prstDash val="solid"/>
+                <a:tailEnd type="arrow"/>
+              </a:ln>
+              <a:effectLst/>
+            </p:spPr>
+            <p:style>
+              <a:lnRef idx="2">
+                <a:schemeClr val="accent1"/>
+              </a:lnRef>
+              <a:fillRef idx="0">
+                <a:schemeClr val="accent1"/>
+              </a:fillRef>
+              <a:effectRef idx="1">
+                <a:schemeClr val="accent1"/>
+              </a:effectRef>
+              <a:fontRef idx="minor">
+                <a:schemeClr val="tx1"/>
+              </a:fontRef>
+            </p:style>
+          </p:cxnSp>
+          <p:cxnSp>
+            <p:nvCxnSpPr>
+              <p:cNvPr id="70" name="Straight Arrow Connector 69"/>
+              <p:cNvCxnSpPr/>
+              <p:nvPr/>
+            </p:nvCxnSpPr>
+            <p:spPr>
+              <a:xfrm>
+                <a:off x="2716555" y="3922192"/>
+                <a:ext cx="2040" cy="337141"/>
+              </a:xfrm>
+              <a:prstGeom prst="straightConnector1">
+                <a:avLst/>
+              </a:prstGeom>
+              <a:ln w="19050">
+                <a:solidFill>
+                  <a:schemeClr val="tx1"/>
+                </a:solidFill>
+                <a:prstDash val="solid"/>
+                <a:tailEnd type="arrow"/>
+              </a:ln>
+              <a:effectLst/>
+            </p:spPr>
+            <p:style>
+              <a:lnRef idx="2">
+                <a:schemeClr val="accent1"/>
+              </a:lnRef>
+              <a:fillRef idx="0">
+                <a:schemeClr val="accent1"/>
+              </a:fillRef>
+              <a:effectRef idx="1">
+                <a:schemeClr val="accent1"/>
+              </a:effectRef>
+              <a:fontRef idx="minor">
+                <a:schemeClr val="tx1"/>
+              </a:fontRef>
+            </p:style>
+          </p:cxnSp>
+          <p:sp>
+            <p:nvSpPr>
+              <p:cNvPr id="2" name="TextBox 1"/>
+              <p:cNvSpPr txBox="1"/>
+              <p:nvPr/>
+            </p:nvSpPr>
+            <p:spPr>
+              <a:xfrm>
+                <a:off x="720137" y="4253748"/>
+                <a:ext cx="2582044" cy="329760"/>
+              </a:xfrm>
+              <a:prstGeom prst="rect">
+                <a:avLst/>
+              </a:prstGeom>
+              <a:noFill/>
+              <a:ln w="19050">
+                <a:noFill/>
+              </a:ln>
+            </p:spPr>
+            <p:txBody>
+              <a:bodyPr wrap="square" rtlCol="0">
+                <a:spAutoFit/>
+              </a:bodyPr>
+              <a:lstStyle/>
+              <a:p>
+                <a:pPr algn="ctr"/>
+                <a:r>
+                  <a:rPr lang="en-US" sz="2400" b="1" dirty="0"/>
+                  <a:t>To/From Duplicator</a:t>
+                </a:r>
+              </a:p>
+            </p:txBody>
+          </p:sp>
+        </p:grpSp>
+        <p:grpSp>
+          <p:nvGrpSpPr>
+            <p:cNvPr id="6" name="Group 5"/>
+            <p:cNvGrpSpPr/>
+            <p:nvPr/>
+          </p:nvGrpSpPr>
+          <p:grpSpPr>
+            <a:xfrm>
+              <a:off x="4865459" y="1368791"/>
+              <a:ext cx="3740746" cy="5048121"/>
+              <a:chOff x="4277825" y="961537"/>
+              <a:chExt cx="2671956" cy="3605800"/>
+            </a:xfrm>
+          </p:grpSpPr>
+          <p:sp>
+            <p:nvSpPr>
+              <p:cNvPr id="53" name="Rounded Rectangle 52"/>
+              <p:cNvSpPr/>
+              <p:nvPr/>
+            </p:nvSpPr>
+            <p:spPr>
+              <a:xfrm>
+                <a:off x="4277825" y="1905531"/>
+                <a:ext cx="2671956" cy="2000491"/>
+              </a:xfrm>
+              <a:prstGeom prst="roundRect">
+                <a:avLst>
+                  <a:gd name="adj" fmla="val 7797"/>
+                </a:avLst>
+              </a:prstGeom>
+              <a:solidFill>
+                <a:schemeClr val="bg1">
+                  <a:lumMod val="85000"/>
+                </a:schemeClr>
+              </a:solidFill>
+              <a:ln w="19050" cmpd="sng">
+                <a:solidFill>
+                  <a:schemeClr val="tx1"/>
+                </a:solidFill>
+              </a:ln>
+              <a:effectLst/>
+            </p:spPr>
+            <p:style>
+              <a:lnRef idx="1">
+                <a:schemeClr val="accent1"/>
+              </a:lnRef>
+              <a:fillRef idx="3">
+                <a:schemeClr val="accent1"/>
+              </a:fillRef>
+              <a:effectRef idx="2">
+                <a:schemeClr val="accent1"/>
+              </a:effectRef>
+              <a:fontRef idx="minor">
+                <a:schemeClr val="lt1"/>
+              </a:fontRef>
+            </p:style>
+            <p:txBody>
+              <a:bodyPr anchor="ctr"/>
+              <a:lstStyle/>
+              <a:p>
+                <a:pPr algn="ctr">
+                  <a:defRPr/>
+                </a:pPr>
+                <a:endParaRPr lang="en-US">
+                  <a:solidFill>
+                    <a:srgbClr val="FFFFFF"/>
+                  </a:solidFill>
+                  <a:latin typeface="Arial"/>
+                  <a:ea typeface="ＭＳ Ｐゴシック"/>
+                </a:endParaRPr>
+              </a:p>
+            </p:txBody>
+          </p:sp>
+          <p:sp>
+            <p:nvSpPr>
+              <p:cNvPr id="54" name="Rounded Rectangle 53"/>
+              <p:cNvSpPr/>
+              <p:nvPr/>
+            </p:nvSpPr>
+            <p:spPr>
+              <a:xfrm>
+                <a:off x="4487664" y="2602287"/>
+                <a:ext cx="909460" cy="831737"/>
+              </a:xfrm>
+              <a:prstGeom prst="roundRect">
+                <a:avLst/>
+              </a:prstGeom>
+              <a:solidFill>
+                <a:srgbClr val="FF6600"/>
+              </a:solidFill>
+              <a:ln w="19050">
+                <a:solidFill>
+                  <a:srgbClr val="000000"/>
+                </a:solidFill>
+              </a:ln>
+              <a:effectLst/>
+            </p:spPr>
+            <p:style>
+              <a:lnRef idx="1">
+                <a:schemeClr val="accent1"/>
+              </a:lnRef>
+              <a:fillRef idx="3">
+                <a:schemeClr val="accent1"/>
+              </a:fillRef>
+              <a:effectRef idx="2">
+                <a:schemeClr val="accent1"/>
+              </a:effectRef>
+              <a:fontRef idx="minor">
+                <a:schemeClr val="lt1"/>
+              </a:fontRef>
+            </p:style>
+            <p:txBody>
+              <a:bodyPr anchor="ctr"/>
+              <a:lstStyle>
+                <a:lvl1pPr>
+                  <a:defRPr>
+                    <a:solidFill>
+                      <a:schemeClr val="lt1"/>
+                    </a:solidFill>
+                    <a:latin typeface="+mn-lt"/>
+                    <a:ea typeface="+mn-ea"/>
+                    <a:cs typeface="+mn-cs"/>
+                  </a:defRPr>
+                </a:lvl1pPr>
+                <a:lvl2pPr>
+                  <a:defRPr>
+                    <a:solidFill>
+                      <a:schemeClr val="lt1"/>
+                    </a:solidFill>
+                    <a:latin typeface="+mn-lt"/>
+                    <a:ea typeface="+mn-ea"/>
+                    <a:cs typeface="+mn-cs"/>
+                  </a:defRPr>
+                </a:lvl2pPr>
+                <a:lvl3pPr>
+                  <a:defRPr>
+                    <a:solidFill>
+                      <a:schemeClr val="lt1"/>
+                    </a:solidFill>
+                    <a:latin typeface="+mn-lt"/>
+                    <a:ea typeface="+mn-ea"/>
+                    <a:cs typeface="+mn-cs"/>
+                  </a:defRPr>
+                </a:lvl3pPr>
+                <a:lvl4pPr>
+                  <a:defRPr>
+                    <a:solidFill>
+                      <a:schemeClr val="lt1"/>
+                    </a:solidFill>
+                    <a:latin typeface="+mn-lt"/>
+                    <a:ea typeface="+mn-ea"/>
+                    <a:cs typeface="+mn-cs"/>
+                  </a:defRPr>
+                </a:lvl4pPr>
+                <a:lvl5pPr>
+                  <a:defRPr>
+                    <a:solidFill>
+                      <a:schemeClr val="lt1"/>
+                    </a:solidFill>
+                    <a:latin typeface="+mn-lt"/>
+                    <a:ea typeface="+mn-ea"/>
+                    <a:cs typeface="+mn-cs"/>
+                  </a:defRPr>
+                </a:lvl5pPr>
+                <a:lvl6pPr>
+                  <a:defRPr>
+                    <a:solidFill>
+                      <a:schemeClr val="lt1"/>
+                    </a:solidFill>
+                    <a:latin typeface="+mn-lt"/>
+                    <a:ea typeface="+mn-ea"/>
+                    <a:cs typeface="+mn-cs"/>
+                  </a:defRPr>
+                </a:lvl6pPr>
+                <a:lvl7pPr>
+                  <a:defRPr>
+                    <a:solidFill>
+                      <a:schemeClr val="lt1"/>
+                    </a:solidFill>
+                    <a:latin typeface="+mn-lt"/>
+                    <a:ea typeface="+mn-ea"/>
+                    <a:cs typeface="+mn-cs"/>
+                  </a:defRPr>
+                </a:lvl7pPr>
+                <a:lvl8pPr>
+                  <a:defRPr>
+                    <a:solidFill>
+                      <a:schemeClr val="lt1"/>
+                    </a:solidFill>
+                    <a:latin typeface="+mn-lt"/>
+                    <a:ea typeface="+mn-ea"/>
+                    <a:cs typeface="+mn-cs"/>
+                  </a:defRPr>
+                </a:lvl8pPr>
+                <a:lvl9pPr>
+                  <a:defRPr>
+                    <a:solidFill>
+                      <a:schemeClr val="lt1"/>
+                    </a:solidFill>
+                    <a:latin typeface="+mn-lt"/>
+                    <a:ea typeface="+mn-ea"/>
+                    <a:cs typeface="+mn-cs"/>
+                  </a:defRPr>
+                </a:lvl9pPr>
+              </a:lstStyle>
+              <a:p>
+                <a:pPr algn="ctr">
+                  <a:defRPr/>
+                </a:pPr>
+                <a:r>
+                  <a:rPr lang="en-US" sz="3200" b="1" kern="1200" dirty="0" smtClean="0">
+                    <a:solidFill>
+                      <a:srgbClr val="000000"/>
+                    </a:solidFill>
+                    <a:latin typeface="Arial"/>
+                    <a:ea typeface="ＭＳ Ｐゴシック"/>
+                  </a:rPr>
+                  <a:t>P1</a:t>
+                </a:r>
+                <a:endParaRPr lang="en-US" b="1" kern="1200" dirty="0">
+                  <a:solidFill>
+                    <a:srgbClr val="000000"/>
+                  </a:solidFill>
+                  <a:latin typeface="Arial"/>
+                  <a:ea typeface="ＭＳ Ｐゴシック"/>
+                </a:endParaRPr>
+              </a:p>
+            </p:txBody>
+          </p:sp>
+          <p:sp>
+            <p:nvSpPr>
+              <p:cNvPr id="57" name="Rounded Rectangle 56"/>
+              <p:cNvSpPr/>
+              <p:nvPr/>
+            </p:nvSpPr>
+            <p:spPr>
+              <a:xfrm>
+                <a:off x="5822453" y="2608592"/>
+                <a:ext cx="909460" cy="820500"/>
+              </a:xfrm>
+              <a:prstGeom prst="roundRect">
+                <a:avLst/>
+              </a:prstGeom>
+              <a:solidFill>
+                <a:srgbClr val="FF6600"/>
+              </a:solidFill>
+              <a:ln w="19050">
+                <a:solidFill>
+                  <a:srgbClr val="000000"/>
+                </a:solidFill>
+              </a:ln>
+              <a:effectLst/>
+            </p:spPr>
+            <p:style>
+              <a:lnRef idx="1">
+                <a:schemeClr val="accent1"/>
+              </a:lnRef>
+              <a:fillRef idx="3">
+                <a:schemeClr val="accent1"/>
+              </a:fillRef>
+              <a:effectRef idx="2">
+                <a:schemeClr val="accent1"/>
+              </a:effectRef>
+              <a:fontRef idx="minor">
+                <a:schemeClr val="lt1"/>
+              </a:fontRef>
+            </p:style>
+            <p:txBody>
+              <a:bodyPr anchor="ctr"/>
+              <a:lstStyle>
+                <a:lvl1pPr>
+                  <a:defRPr>
+                    <a:solidFill>
+                      <a:schemeClr val="lt1"/>
+                    </a:solidFill>
+                    <a:latin typeface="+mn-lt"/>
+                    <a:ea typeface="+mn-ea"/>
+                    <a:cs typeface="+mn-cs"/>
+                  </a:defRPr>
+                </a:lvl1pPr>
+                <a:lvl2pPr>
+                  <a:defRPr>
+                    <a:solidFill>
+                      <a:schemeClr val="lt1"/>
+                    </a:solidFill>
+                    <a:latin typeface="+mn-lt"/>
+                    <a:ea typeface="+mn-ea"/>
+                    <a:cs typeface="+mn-cs"/>
+                  </a:defRPr>
+                </a:lvl2pPr>
+                <a:lvl3pPr>
+                  <a:defRPr>
+                    <a:solidFill>
+                      <a:schemeClr val="lt1"/>
+                    </a:solidFill>
+                    <a:latin typeface="+mn-lt"/>
+                    <a:ea typeface="+mn-ea"/>
+                    <a:cs typeface="+mn-cs"/>
+                  </a:defRPr>
+                </a:lvl3pPr>
+                <a:lvl4pPr>
+                  <a:defRPr>
+                    <a:solidFill>
+                      <a:schemeClr val="lt1"/>
+                    </a:solidFill>
+                    <a:latin typeface="+mn-lt"/>
+                    <a:ea typeface="+mn-ea"/>
+                    <a:cs typeface="+mn-cs"/>
+                  </a:defRPr>
+                </a:lvl4pPr>
+                <a:lvl5pPr>
+                  <a:defRPr>
+                    <a:solidFill>
+                      <a:schemeClr val="lt1"/>
+                    </a:solidFill>
+                    <a:latin typeface="+mn-lt"/>
+                    <a:ea typeface="+mn-ea"/>
+                    <a:cs typeface="+mn-cs"/>
+                  </a:defRPr>
+                </a:lvl5pPr>
+                <a:lvl6pPr>
+                  <a:defRPr>
+                    <a:solidFill>
+                      <a:schemeClr val="lt1"/>
+                    </a:solidFill>
+                    <a:latin typeface="+mn-lt"/>
+                    <a:ea typeface="+mn-ea"/>
+                    <a:cs typeface="+mn-cs"/>
+                  </a:defRPr>
+                </a:lvl6pPr>
+                <a:lvl7pPr>
+                  <a:defRPr>
+                    <a:solidFill>
+                      <a:schemeClr val="lt1"/>
+                    </a:solidFill>
+                    <a:latin typeface="+mn-lt"/>
+                    <a:ea typeface="+mn-ea"/>
+                    <a:cs typeface="+mn-cs"/>
+                  </a:defRPr>
+                </a:lvl7pPr>
+                <a:lvl8pPr>
+                  <a:defRPr>
+                    <a:solidFill>
+                      <a:schemeClr val="lt1"/>
+                    </a:solidFill>
+                    <a:latin typeface="+mn-lt"/>
+                    <a:ea typeface="+mn-ea"/>
+                    <a:cs typeface="+mn-cs"/>
+                  </a:defRPr>
+                </a:lvl8pPr>
+                <a:lvl9pPr>
+                  <a:defRPr>
+                    <a:solidFill>
+                      <a:schemeClr val="lt1"/>
+                    </a:solidFill>
+                    <a:latin typeface="+mn-lt"/>
+                    <a:ea typeface="+mn-ea"/>
+                    <a:cs typeface="+mn-cs"/>
+                  </a:defRPr>
+                </a:lvl9pPr>
+              </a:lstStyle>
+              <a:p>
+                <a:pPr algn="ctr">
+                  <a:defRPr/>
+                </a:pPr>
+                <a:r>
+                  <a:rPr lang="en-US" sz="3200" b="1" dirty="0">
+                    <a:solidFill>
+                      <a:srgbClr val="000000"/>
+                    </a:solidFill>
+                    <a:latin typeface="Arial"/>
+                    <a:ea typeface="ＭＳ Ｐゴシック"/>
+                  </a:rPr>
+                  <a:t>D</a:t>
+                </a:r>
+                <a:r>
+                  <a:rPr lang="en-US" sz="3200" b="1" dirty="0" smtClean="0">
+                    <a:solidFill>
+                      <a:srgbClr val="000000"/>
+                    </a:solidFill>
+                    <a:latin typeface="Arial"/>
+                    <a:ea typeface="ＭＳ Ｐゴシック"/>
+                  </a:rPr>
+                  <a:t>1</a:t>
+                </a:r>
+                <a:endParaRPr lang="en-US" b="1" kern="1200" dirty="0">
+                  <a:solidFill>
+                    <a:srgbClr val="000000"/>
+                  </a:solidFill>
+                  <a:latin typeface="Arial"/>
+                  <a:ea typeface="ＭＳ Ｐゴシック"/>
+                </a:endParaRPr>
+              </a:p>
+            </p:txBody>
+          </p:sp>
+          <p:sp>
+            <p:nvSpPr>
+              <p:cNvPr id="59" name="Rectangle 58"/>
+              <p:cNvSpPr/>
+              <p:nvPr/>
+            </p:nvSpPr>
+            <p:spPr>
+              <a:xfrm>
+                <a:off x="4317693" y="961537"/>
+                <a:ext cx="2582039" cy="606853"/>
+              </a:xfrm>
+              <a:prstGeom prst="rect">
+                <a:avLst/>
+              </a:prstGeom>
+              <a:solidFill>
+                <a:schemeClr val="accent5"/>
+              </a:solidFill>
+              <a:ln w="19050">
+                <a:solidFill>
+                  <a:schemeClr val="tx1"/>
+                </a:solidFill>
+              </a:ln>
+              <a:effectLst/>
+            </p:spPr>
+            <p:style>
+              <a:lnRef idx="1">
+                <a:schemeClr val="accent1"/>
+              </a:lnRef>
+              <a:fillRef idx="3">
+                <a:schemeClr val="accent1"/>
+              </a:fillRef>
+              <a:effectRef idx="2">
+                <a:schemeClr val="accent1"/>
+              </a:effectRef>
+              <a:fontRef idx="minor">
+                <a:schemeClr val="lt1"/>
+              </a:fontRef>
+            </p:style>
+            <p:txBody>
+              <a:bodyPr rtlCol="0" anchor="ctr"/>
+              <a:lstStyle/>
+              <a:p>
+                <a:pPr algn="ctr"/>
+                <a:r>
+                  <a:rPr lang="en-US" sz="3600" b="1" dirty="0" smtClean="0">
+                    <a:solidFill>
+                      <a:srgbClr val="000000"/>
+                    </a:solidFill>
+                  </a:rPr>
+                  <a:t>Clone Manager</a:t>
+                </a:r>
+                <a:endParaRPr lang="en-US" sz="3600" b="1" dirty="0">
+                  <a:solidFill>
+                    <a:srgbClr val="000000"/>
+                  </a:solidFill>
+                </a:endParaRPr>
+              </a:p>
+            </p:txBody>
+          </p:sp>
+          <p:cxnSp>
+            <p:nvCxnSpPr>
+              <p:cNvPr id="60" name="Straight Arrow Connector 59"/>
+              <p:cNvCxnSpPr>
+                <a:stCxn id="59" idx="2"/>
+                <a:endCxn id="53" idx="0"/>
+              </p:cNvCxnSpPr>
+              <p:nvPr/>
+            </p:nvCxnSpPr>
+            <p:spPr>
+              <a:xfrm>
+                <a:off x="5608712" y="1568390"/>
+                <a:ext cx="5091" cy="337141"/>
+              </a:xfrm>
+              <a:prstGeom prst="straightConnector1">
+                <a:avLst/>
+              </a:prstGeom>
+              <a:ln w="19050">
+                <a:solidFill>
+                  <a:schemeClr val="tx1"/>
+                </a:solidFill>
+                <a:prstDash val="dash"/>
+                <a:tailEnd type="arrow"/>
+              </a:ln>
+              <a:effectLst/>
+            </p:spPr>
+            <p:style>
+              <a:lnRef idx="2">
+                <a:schemeClr val="accent1"/>
+              </a:lnRef>
+              <a:fillRef idx="0">
+                <a:schemeClr val="accent1"/>
+              </a:fillRef>
+              <a:effectRef idx="1">
+                <a:schemeClr val="accent1"/>
+              </a:effectRef>
+              <a:fontRef idx="minor">
+                <a:schemeClr val="tx1"/>
+              </a:fontRef>
+            </p:style>
+          </p:cxnSp>
+          <p:sp>
+            <p:nvSpPr>
+              <p:cNvPr id="63" name="Rectangle 62"/>
+              <p:cNvSpPr/>
+              <p:nvPr/>
+            </p:nvSpPr>
+            <p:spPr>
+              <a:xfrm>
+                <a:off x="4498902" y="2017911"/>
+                <a:ext cx="2322923" cy="370855"/>
+              </a:xfrm>
+              <a:prstGeom prst="rect">
+                <a:avLst/>
+              </a:prstGeom>
+              <a:solidFill>
+                <a:schemeClr val="tx2">
+                  <a:lumMod val="40000"/>
+                  <a:lumOff val="60000"/>
+                </a:schemeClr>
+              </a:solidFill>
+              <a:ln w="19050">
+                <a:solidFill>
+                  <a:schemeClr val="tx1"/>
+                </a:solidFill>
+              </a:ln>
+              <a:effectLst/>
+            </p:spPr>
+            <p:style>
+              <a:lnRef idx="1">
+                <a:schemeClr val="accent1"/>
+              </a:lnRef>
+              <a:fillRef idx="3">
+                <a:schemeClr val="accent1"/>
+              </a:fillRef>
+              <a:effectRef idx="2">
+                <a:schemeClr val="accent1"/>
+              </a:effectRef>
+              <a:fontRef idx="minor">
+                <a:schemeClr val="lt1"/>
+              </a:fontRef>
+            </p:style>
+            <p:txBody>
+              <a:bodyPr rtlCol="0" anchor="ctr"/>
+              <a:lstStyle/>
+              <a:p>
+                <a:pPr algn="ctr"/>
+                <a:r>
+                  <a:rPr lang="en-US" sz="3200" b="1" dirty="0" smtClean="0">
+                    <a:solidFill>
+                      <a:srgbClr val="000000"/>
+                    </a:solidFill>
+                  </a:rPr>
+                  <a:t>Agent</a:t>
+                </a:r>
+                <a:endParaRPr lang="en-US" b="1" dirty="0">
+                  <a:solidFill>
+                    <a:srgbClr val="000000"/>
+                  </a:solidFill>
+                </a:endParaRPr>
+              </a:p>
+            </p:txBody>
+          </p:sp>
+          <p:cxnSp>
+            <p:nvCxnSpPr>
+              <p:cNvPr id="71" name="Straight Arrow Connector 70"/>
+              <p:cNvCxnSpPr/>
+              <p:nvPr/>
+            </p:nvCxnSpPr>
+            <p:spPr>
+              <a:xfrm>
+                <a:off x="4945786" y="3910954"/>
+                <a:ext cx="2040" cy="337141"/>
+              </a:xfrm>
+              <a:prstGeom prst="straightConnector1">
+                <a:avLst/>
+              </a:prstGeom>
+              <a:ln w="19050">
+                <a:solidFill>
+                  <a:schemeClr val="tx1"/>
+                </a:solidFill>
+                <a:prstDash val="solid"/>
+                <a:tailEnd type="arrow"/>
+              </a:ln>
+              <a:effectLst/>
+            </p:spPr>
+            <p:style>
+              <a:lnRef idx="2">
+                <a:schemeClr val="accent1"/>
+              </a:lnRef>
+              <a:fillRef idx="0">
+                <a:schemeClr val="accent1"/>
+              </a:fillRef>
+              <a:effectRef idx="1">
+                <a:schemeClr val="accent1"/>
+              </a:effectRef>
+              <a:fontRef idx="minor">
+                <a:schemeClr val="tx1"/>
+              </a:fontRef>
+            </p:style>
+          </p:cxnSp>
+          <p:cxnSp>
+            <p:nvCxnSpPr>
+              <p:cNvPr id="72" name="Straight Arrow Connector 71"/>
+              <p:cNvCxnSpPr/>
+              <p:nvPr/>
+            </p:nvCxnSpPr>
+            <p:spPr>
+              <a:xfrm>
+                <a:off x="6226985" y="3910954"/>
+                <a:ext cx="2040" cy="337141"/>
+              </a:xfrm>
+              <a:prstGeom prst="straightConnector1">
+                <a:avLst/>
+              </a:prstGeom>
+              <a:ln w="19050">
+                <a:solidFill>
+                  <a:schemeClr val="tx1"/>
+                </a:solidFill>
+                <a:prstDash val="solid"/>
+                <a:tailEnd type="arrow"/>
+              </a:ln>
+              <a:effectLst/>
+            </p:spPr>
+            <p:style>
+              <a:lnRef idx="2">
+                <a:schemeClr val="accent1"/>
+              </a:lnRef>
+              <a:fillRef idx="0">
+                <a:schemeClr val="accent1"/>
+              </a:fillRef>
+              <a:effectRef idx="1">
+                <a:schemeClr val="accent1"/>
+              </a:effectRef>
+              <a:fontRef idx="minor">
+                <a:schemeClr val="tx1"/>
+              </a:fontRef>
+            </p:style>
+          </p:cxnSp>
+          <p:sp>
+            <p:nvSpPr>
+              <p:cNvPr id="28" name="TextBox 27"/>
+              <p:cNvSpPr txBox="1"/>
+              <p:nvPr/>
+            </p:nvSpPr>
+            <p:spPr>
+              <a:xfrm>
+                <a:off x="4277825" y="4237576"/>
+                <a:ext cx="2671956" cy="329761"/>
+              </a:xfrm>
+              <a:prstGeom prst="rect">
+                <a:avLst/>
+              </a:prstGeom>
+              <a:noFill/>
+              <a:ln w="19050">
+                <a:noFill/>
+              </a:ln>
+            </p:spPr>
+            <p:txBody>
+              <a:bodyPr wrap="square" rtlCol="0">
+                <a:spAutoFit/>
+              </a:bodyPr>
+              <a:lstStyle/>
+              <a:p>
+                <a:pPr algn="ctr"/>
+                <a:r>
+                  <a:rPr lang="en-US" sz="2400" b="1" dirty="0"/>
+                  <a:t>To/From Duplicator</a:t>
+                </a:r>
+              </a:p>
+            </p:txBody>
+          </p:sp>
+        </p:grpSp>
+        <p:cxnSp>
+          <p:nvCxnSpPr>
+            <p:cNvPr id="9" name="Straight Connector 8"/>
+            <p:cNvCxnSpPr/>
+            <p:nvPr/>
+          </p:nvCxnSpPr>
+          <p:spPr>
+            <a:xfrm>
+              <a:off x="4732648" y="725237"/>
+              <a:ext cx="0" cy="5356374"/>
+            </a:xfrm>
+            <a:prstGeom prst="line">
+              <a:avLst/>
+            </a:prstGeom>
+            <a:ln w="19050">
               <a:solidFill>
                 <a:schemeClr val="tx1"/>
               </a:solidFill>
+              <a:prstDash val="lgDash"/>
             </a:ln>
             <a:effectLst/>
           </p:spPr>
           <p:style>
-            <a:lnRef idx="1">
+            <a:lnRef idx="2">
               <a:schemeClr val="accent1"/>
             </a:lnRef>
-            <a:fillRef idx="3">
+            <a:fillRef idx="0">
               <a:schemeClr val="accent1"/>
             </a:fillRef>
-            <a:effectRef idx="2">
+            <a:effectRef idx="1">
               <a:schemeClr val="accent1"/>
             </a:effectRef>
             <a:fontRef idx="minor">
-              <a:schemeClr val="lt1"/>
+              <a:schemeClr val="tx1"/>
             </a:fontRef>
           </p:style>
+        </p:cxnSp>
+        <p:sp>
+          <p:nvSpPr>
+            <p:cNvPr id="14" name="TextBox 13"/>
+            <p:cNvSpPr txBox="1"/>
+            <p:nvPr/>
+          </p:nvSpPr>
+          <p:spPr>
+            <a:xfrm>
+              <a:off x="1008192" y="561535"/>
+              <a:ext cx="3614862" cy="631625"/>
+            </a:xfrm>
+            <a:prstGeom prst="rect">
+              <a:avLst/>
+            </a:prstGeom>
+            <a:noFill/>
+            <a:ln w="19050">
+              <a:noFill/>
+            </a:ln>
+          </p:spPr>
           <p:txBody>
-            <a:bodyPr anchor="ctr"/>
+            <a:bodyPr wrap="square" lIns="137840" tIns="68918" rIns="137840" bIns="68918" rtlCol="0">
+              <a:spAutoFit/>
+            </a:bodyPr>
             <a:lstStyle/>
             <a:p>
-              <a:pPr algn="ctr">
-                <a:defRPr/>
-              </a:pPr>
-              <a:endParaRPr lang="en-US">
-                <a:solidFill>
-                  <a:srgbClr val="FFFFFF"/>
-                </a:solidFill>
-                <a:latin typeface="Arial"/>
-                <a:ea typeface="ＭＳ Ｐゴシック"/>
-              </a:endParaRPr>
+              <a:pPr algn="ctr"/>
+              <a:r>
+                <a:rPr lang="en-US" sz="3200" b="1" dirty="0" smtClean="0"/>
+                <a:t>External Mode</a:t>
+              </a:r>
+              <a:endParaRPr lang="en-US" sz="3200" b="1" dirty="0"/>
             </a:p>
           </p:txBody>
         </p:sp>
         <p:sp>
           <p:nvSpPr>
-            <p:cNvPr id="27" name="Rounded Rectangle 26"/>
-            <p:cNvSpPr/>
+            <p:cNvPr id="35" name="TextBox 34"/>
+            <p:cNvSpPr txBox="1"/>
             <p:nvPr/>
           </p:nvSpPr>
           <p:spPr>
             <a:xfrm>
-              <a:off x="851301" y="2584743"/>
-              <a:ext cx="909460" cy="831737"/>
-            </a:xfrm>
-            <a:prstGeom prst="roundRect">
-              <a:avLst/>
-            </a:prstGeom>
-            <a:solidFill>
-              <a:srgbClr val="FF6600"/>
-            </a:solidFill>
+              <a:off x="4865459" y="561535"/>
+              <a:ext cx="3740746" cy="631625"/>
+            </a:xfrm>
+            <a:prstGeom prst="rect">
+              <a:avLst/>
+            </a:prstGeom>
+            <a:noFill/>
             <a:ln w="19050">
-              <a:solidFill>
-                <a:srgbClr val="000000"/>
-              </a:solidFill>
+              <a:noFill/>
             </a:ln>
-            <a:effectLst/>
-          </p:spPr>
-          <p:style>
-            <a:lnRef idx="1">
-              <a:schemeClr val="accent1"/>
-            </a:lnRef>
-            <a:fillRef idx="3">
-              <a:schemeClr val="accent1"/>
-            </a:fillRef>
-            <a:effectRef idx="2">
-              <a:schemeClr val="accent1"/>
-            </a:effectRef>
-            <a:fontRef idx="minor">
-              <a:schemeClr val="lt1"/>
-            </a:fontRef>
-          </p:style>
+          </p:spPr>
           <p:txBody>
-            <a:bodyPr anchor="ctr"/>
-            <a:lstStyle>
-              <a:lvl1pPr>
-                <a:defRPr>
-                  <a:solidFill>
-                    <a:schemeClr val="lt1"/>
-                  </a:solidFill>
-                  <a:latin typeface="+mn-lt"/>
-                  <a:ea typeface="+mn-ea"/>
-                  <a:cs typeface="+mn-cs"/>
-                </a:defRPr>
-              </a:lvl1pPr>
-              <a:lvl2pPr>
-                <a:defRPr>
-                  <a:solidFill>
-                    <a:schemeClr val="lt1"/>
-                  </a:solidFill>
-                  <a:latin typeface="+mn-lt"/>
-                  <a:ea typeface="+mn-ea"/>
-                  <a:cs typeface="+mn-cs"/>
-                </a:defRPr>
-              </a:lvl2pPr>
-              <a:lvl3pPr>
-                <a:defRPr>
-                  <a:solidFill>
-                    <a:schemeClr val="lt1"/>
-                  </a:solidFill>
-                  <a:latin typeface="+mn-lt"/>
-                  <a:ea typeface="+mn-ea"/>
-                  <a:cs typeface="+mn-cs"/>
-                </a:defRPr>
-              </a:lvl3pPr>
-              <a:lvl4pPr>
-                <a:defRPr>
-                  <a:solidFill>
-                    <a:schemeClr val="lt1"/>
-                  </a:solidFill>
-                  <a:latin typeface="+mn-lt"/>
-                  <a:ea typeface="+mn-ea"/>
-                  <a:cs typeface="+mn-cs"/>
-                </a:defRPr>
-              </a:lvl4pPr>
-              <a:lvl5pPr>
-                <a:defRPr>
-                  <a:solidFill>
-                    <a:schemeClr val="lt1"/>
-                  </a:solidFill>
-                  <a:latin typeface="+mn-lt"/>
-                  <a:ea typeface="+mn-ea"/>
-                  <a:cs typeface="+mn-cs"/>
-                </a:defRPr>
-              </a:lvl5pPr>
-              <a:lvl6pPr>
-                <a:defRPr>
-                  <a:solidFill>
-                    <a:schemeClr val="lt1"/>
-                  </a:solidFill>
-                  <a:latin typeface="+mn-lt"/>
-                  <a:ea typeface="+mn-ea"/>
-                  <a:cs typeface="+mn-cs"/>
-                </a:defRPr>
-              </a:lvl6pPr>
-              <a:lvl7pPr>
-                <a:defRPr>
-                  <a:solidFill>
-                    <a:schemeClr val="lt1"/>
-                  </a:solidFill>
-                  <a:latin typeface="+mn-lt"/>
-                  <a:ea typeface="+mn-ea"/>
-                  <a:cs typeface="+mn-cs"/>
-                </a:defRPr>
-              </a:lvl7pPr>
-              <a:lvl8pPr>
-                <a:defRPr>
-                  <a:solidFill>
-                    <a:schemeClr val="lt1"/>
-                  </a:solidFill>
-                  <a:latin typeface="+mn-lt"/>
-                  <a:ea typeface="+mn-ea"/>
-                  <a:cs typeface="+mn-cs"/>
-                </a:defRPr>
-              </a:lvl8pPr>
-              <a:lvl9pPr>
-                <a:defRPr>
-                  <a:solidFill>
-                    <a:schemeClr val="lt1"/>
-                  </a:solidFill>
-                  <a:latin typeface="+mn-lt"/>
-                  <a:ea typeface="+mn-ea"/>
-                  <a:cs typeface="+mn-cs"/>
-                </a:defRPr>
-              </a:lvl9pPr>
-            </a:lstStyle>
+            <a:bodyPr wrap="square" lIns="137840" tIns="68918" rIns="137840" bIns="68918" rtlCol="0">
+              <a:spAutoFit/>
+            </a:bodyPr>
+            <a:lstStyle/>
             <a:p>
-              <a:pPr algn="ctr">
-                <a:defRPr/>
-              </a:pPr>
+              <a:pPr algn="ctr"/>
               <a:r>
-                <a:rPr lang="en-US" sz="3200" b="1" kern="1200" dirty="0" smtClean="0">
-                  <a:solidFill>
-                    <a:srgbClr val="000000"/>
-                  </a:solidFill>
-                  <a:latin typeface="Arial"/>
-                  <a:ea typeface="ＭＳ Ｐゴシック"/>
-                </a:rPr>
-                <a:t>P1</a:t>
+                <a:rPr lang="en-US" sz="3200" b="1" dirty="0" smtClean="0"/>
+                <a:t>Internal Mode</a:t>
               </a:r>
-              <a:endParaRPr lang="en-US" b="1" kern="1200" dirty="0">
-                <a:solidFill>
-                  <a:srgbClr val="000000"/>
-                </a:solidFill>
-                <a:latin typeface="Arial"/>
-                <a:ea typeface="ＭＳ Ｐゴシック"/>
-              </a:endParaRPr>
+              <a:endParaRPr lang="en-US" sz="3200" b="1" dirty="0"/>
             </a:p>
           </p:txBody>
         </p:sp>
-        <p:sp>
-          <p:nvSpPr>
-            <p:cNvPr id="3" name="Rectangle 2"/>
-            <p:cNvSpPr/>
-            <p:nvPr/>
-          </p:nvSpPr>
+        <p:cxnSp>
+          <p:nvCxnSpPr>
+            <p:cNvPr id="36" name="Straight Connector 35"/>
+            <p:cNvCxnSpPr/>
+            <p:nvPr/>
+          </p:nvCxnSpPr>
           <p:spPr>
             <a:xfrm>
-              <a:off x="851301" y="3528861"/>
-              <a:ext cx="909460" cy="280951"/>
-            </a:xfrm>
-            <a:prstGeom prst="rect">
-              <a:avLst/>
-            </a:prstGeom>
-            <a:solidFill>
-              <a:srgbClr val="CCFFCC"/>
-            </a:solidFill>
+              <a:off x="1280149" y="1193595"/>
+              <a:ext cx="7146917" cy="0"/>
+            </a:xfrm>
+            <a:prstGeom prst="line">
+              <a:avLst/>
+            </a:prstGeom>
             <a:ln w="19050">
               <a:solidFill>
                 <a:schemeClr val="tx1"/>
               </a:solidFill>
+              <a:prstDash val="solid"/>
+            </a:ln>
+            <a:effectLst/>
+          </p:spPr>
+          <p:style>
+            <a:lnRef idx="2">
+              <a:schemeClr val="accent1"/>
+            </a:lnRef>
+            <a:fillRef idx="0">
+              <a:schemeClr val="accent1"/>
+            </a:fillRef>
+            <a:effectRef idx="1">
+              <a:schemeClr val="accent1"/>
+            </a:effectRef>
+            <a:fontRef idx="minor">
+              <a:schemeClr val="tx1"/>
+            </a:fontRef>
+          </p:style>
+        </p:cxnSp>
+        <p:sp>
+          <p:nvSpPr>
+            <p:cNvPr id="34" name="Rectangle 33"/>
+            <p:cNvSpPr/>
+            <p:nvPr/>
+          </p:nvSpPr>
+          <p:spPr>
+            <a:xfrm>
+              <a:off x="6735832" y="3519463"/>
+              <a:ext cx="1800303" cy="1893148"/>
+            </a:xfrm>
+            <a:prstGeom prst="rect">
+              <a:avLst/>
+            </a:prstGeom>
+            <a:noFill/>
+            <a:ln w="19050">
+              <a:solidFill>
+                <a:schemeClr val="tx1"/>
+              </a:solidFill>
+              <a:prstDash val="dash"/>
             </a:ln>
             <a:effectLst/>
           </p:spPr>
@@ -8276,258 +9782,65 @@
             <a:lstStyle/>
             <a:p>
               <a:pPr algn="ctr"/>
+              <a:endParaRPr lang="en-US" dirty="0" smtClean="0"/>
+            </a:p>
+            <a:p>
+              <a:pPr algn="ctr"/>
+              <a:endParaRPr lang="en-US" sz="1800" dirty="0">
+                <a:solidFill>
+                  <a:srgbClr val="000000"/>
+                </a:solidFill>
+              </a:endParaRPr>
+            </a:p>
+            <a:p>
+              <a:pPr algn="ctr"/>
+              <a:endParaRPr lang="en-US" sz="1800" dirty="0">
+                <a:solidFill>
+                  <a:srgbClr val="000000"/>
+                </a:solidFill>
+              </a:endParaRPr>
+            </a:p>
+            <a:p>
+              <a:pPr algn="ctr"/>
+              <a:endParaRPr lang="en-US" sz="1800" dirty="0">
+                <a:solidFill>
+                  <a:srgbClr val="000000"/>
+                </a:solidFill>
+              </a:endParaRPr>
+            </a:p>
+            <a:p>
+              <a:pPr algn="ctr"/>
               <a:r>
-                <a:rPr lang="en-US" sz="3200" b="1" dirty="0" smtClean="0">
+                <a:rPr lang="en-US" sz="1800" b="1" dirty="0">
                   <a:solidFill>
-                    <a:schemeClr val="tx1"/>
+                    <a:srgbClr val="000000"/>
                   </a:solidFill>
                 </a:rPr>
-                <a:t>NAT</a:t>
+                <a:t>IP namespace 2</a:t>
               </a:r>
-              <a:endParaRPr lang="en-US" sz="3200" b="1" dirty="0">
-                <a:solidFill>
-                  <a:schemeClr val="tx1"/>
-                </a:solidFill>
-              </a:endParaRPr>
             </a:p>
           </p:txBody>
         </p:sp>
         <p:sp>
           <p:nvSpPr>
-            <p:cNvPr id="31" name="Rounded Rectangle 30"/>
+            <p:cNvPr id="37" name="Rectangle 36"/>
             <p:cNvSpPr/>
             <p:nvPr/>
           </p:nvSpPr>
           <p:spPr>
             <a:xfrm>
-              <a:off x="2115456" y="1921701"/>
-              <a:ext cx="1186725" cy="1989253"/>
-            </a:xfrm>
-            <a:prstGeom prst="roundRect">
-              <a:avLst>
-                <a:gd name="adj" fmla="val 7797"/>
-              </a:avLst>
-            </a:prstGeom>
-            <a:solidFill>
-              <a:schemeClr val="bg1">
-                <a:lumMod val="85000"/>
-              </a:schemeClr>
-            </a:solidFill>
-            <a:ln w="19050" cmpd="sng">
-              <a:solidFill>
-                <a:schemeClr val="tx1"/>
-              </a:solidFill>
-            </a:ln>
-            <a:effectLst/>
-          </p:spPr>
-          <p:style>
-            <a:lnRef idx="1">
-              <a:schemeClr val="accent1"/>
-            </a:lnRef>
-            <a:fillRef idx="3">
-              <a:schemeClr val="accent1"/>
-            </a:fillRef>
-            <a:effectRef idx="2">
-              <a:schemeClr val="accent1"/>
-            </a:effectRef>
-            <a:fontRef idx="minor">
-              <a:schemeClr val="lt1"/>
-            </a:fontRef>
-          </p:style>
-          <p:txBody>
-            <a:bodyPr anchor="ctr"/>
-            <a:lstStyle/>
-            <a:p>
-              <a:pPr algn="ctr">
-                <a:defRPr/>
-              </a:pPr>
-              <a:endParaRPr lang="en-US">
-                <a:solidFill>
-                  <a:srgbClr val="FFFFFF"/>
-                </a:solidFill>
-                <a:latin typeface="Arial"/>
-                <a:ea typeface="ＭＳ Ｐゴシック"/>
-              </a:endParaRPr>
-            </a:p>
-          </p:txBody>
-        </p:sp>
-        <p:sp>
-          <p:nvSpPr>
-            <p:cNvPr id="32" name="Rounded Rectangle 31"/>
-            <p:cNvSpPr/>
-            <p:nvPr/>
-          </p:nvSpPr>
-          <p:spPr>
-            <a:xfrm>
-              <a:off x="2246620" y="2584743"/>
-              <a:ext cx="909460" cy="820500"/>
-            </a:xfrm>
-            <a:prstGeom prst="roundRect">
-              <a:avLst/>
-            </a:prstGeom>
-            <a:solidFill>
-              <a:srgbClr val="FF6600"/>
-            </a:solidFill>
-            <a:ln w="19050">
-              <a:solidFill>
-                <a:srgbClr val="000000"/>
-              </a:solidFill>
-            </a:ln>
-            <a:effectLst/>
-          </p:spPr>
-          <p:style>
-            <a:lnRef idx="1">
-              <a:schemeClr val="accent1"/>
-            </a:lnRef>
-            <a:fillRef idx="3">
-              <a:schemeClr val="accent1"/>
-            </a:fillRef>
-            <a:effectRef idx="2">
-              <a:schemeClr val="accent1"/>
-            </a:effectRef>
-            <a:fontRef idx="minor">
-              <a:schemeClr val="lt1"/>
-            </a:fontRef>
-          </p:style>
-          <p:txBody>
-            <a:bodyPr anchor="ctr"/>
-            <a:lstStyle>
-              <a:lvl1pPr>
-                <a:defRPr>
-                  <a:solidFill>
-                    <a:schemeClr val="lt1"/>
-                  </a:solidFill>
-                  <a:latin typeface="+mn-lt"/>
-                  <a:ea typeface="+mn-ea"/>
-                  <a:cs typeface="+mn-cs"/>
-                </a:defRPr>
-              </a:lvl1pPr>
-              <a:lvl2pPr>
-                <a:defRPr>
-                  <a:solidFill>
-                    <a:schemeClr val="lt1"/>
-                  </a:solidFill>
-                  <a:latin typeface="+mn-lt"/>
-                  <a:ea typeface="+mn-ea"/>
-                  <a:cs typeface="+mn-cs"/>
-                </a:defRPr>
-              </a:lvl2pPr>
-              <a:lvl3pPr>
-                <a:defRPr>
-                  <a:solidFill>
-                    <a:schemeClr val="lt1"/>
-                  </a:solidFill>
-                  <a:latin typeface="+mn-lt"/>
-                  <a:ea typeface="+mn-ea"/>
-                  <a:cs typeface="+mn-cs"/>
-                </a:defRPr>
-              </a:lvl3pPr>
-              <a:lvl4pPr>
-                <a:defRPr>
-                  <a:solidFill>
-                    <a:schemeClr val="lt1"/>
-                  </a:solidFill>
-                  <a:latin typeface="+mn-lt"/>
-                  <a:ea typeface="+mn-ea"/>
-                  <a:cs typeface="+mn-cs"/>
-                </a:defRPr>
-              </a:lvl4pPr>
-              <a:lvl5pPr>
-                <a:defRPr>
-                  <a:solidFill>
-                    <a:schemeClr val="lt1"/>
-                  </a:solidFill>
-                  <a:latin typeface="+mn-lt"/>
-                  <a:ea typeface="+mn-ea"/>
-                  <a:cs typeface="+mn-cs"/>
-                </a:defRPr>
-              </a:lvl5pPr>
-              <a:lvl6pPr>
-                <a:defRPr>
-                  <a:solidFill>
-                    <a:schemeClr val="lt1"/>
-                  </a:solidFill>
-                  <a:latin typeface="+mn-lt"/>
-                  <a:ea typeface="+mn-ea"/>
-                  <a:cs typeface="+mn-cs"/>
-                </a:defRPr>
-              </a:lvl6pPr>
-              <a:lvl7pPr>
-                <a:defRPr>
-                  <a:solidFill>
-                    <a:schemeClr val="lt1"/>
-                  </a:solidFill>
-                  <a:latin typeface="+mn-lt"/>
-                  <a:ea typeface="+mn-ea"/>
-                  <a:cs typeface="+mn-cs"/>
-                </a:defRPr>
-              </a:lvl7pPr>
-              <a:lvl8pPr>
-                <a:defRPr>
-                  <a:solidFill>
-                    <a:schemeClr val="lt1"/>
-                  </a:solidFill>
-                  <a:latin typeface="+mn-lt"/>
-                  <a:ea typeface="+mn-ea"/>
-                  <a:cs typeface="+mn-cs"/>
-                </a:defRPr>
-              </a:lvl8pPr>
-              <a:lvl9pPr>
-                <a:defRPr>
-                  <a:solidFill>
-                    <a:schemeClr val="lt1"/>
-                  </a:solidFill>
-                  <a:latin typeface="+mn-lt"/>
-                  <a:ea typeface="+mn-ea"/>
-                  <a:cs typeface="+mn-cs"/>
-                </a:defRPr>
-              </a:lvl9pPr>
-            </a:lstStyle>
-            <a:p>
-              <a:pPr algn="ctr">
-                <a:defRPr/>
-              </a:pPr>
-              <a:r>
-                <a:rPr lang="en-US" sz="3200" b="1" dirty="0" smtClean="0">
-                  <a:solidFill>
-                    <a:srgbClr val="000000"/>
-                  </a:solidFill>
-                  <a:latin typeface="Arial"/>
-                  <a:ea typeface="ＭＳ Ｐゴシック"/>
-                </a:rPr>
-                <a:t>T1</a:t>
-              </a:r>
-              <a:endParaRPr lang="en-US" b="1" kern="1200" dirty="0">
-                <a:solidFill>
-                  <a:srgbClr val="000000"/>
-                </a:solidFill>
-                <a:latin typeface="Arial"/>
-                <a:ea typeface="ＭＳ Ｐゴシック"/>
-              </a:endParaRPr>
-            </a:p>
-          </p:txBody>
-        </p:sp>
-        <p:sp>
-          <p:nvSpPr>
-            <p:cNvPr id="33" name="Rectangle 32"/>
-            <p:cNvSpPr/>
-            <p:nvPr/>
-          </p:nvSpPr>
-          <p:spPr>
-            <a:xfrm>
-              <a:off x="2246620" y="3517623"/>
-              <a:ext cx="909460" cy="280951"/>
+              <a:off x="4921274" y="3519463"/>
+              <a:ext cx="1807431" cy="1893148"/>
             </a:xfrm>
             <a:prstGeom prst="rect">
               <a:avLst/>
             </a:prstGeom>
-            <a:solidFill>
-              <a:srgbClr val="CCFFCC"/>
-            </a:solidFill>
+            <a:noFill/>
             <a:ln w="19050">
               <a:solidFill>
                 <a:schemeClr val="tx1"/>
               </a:solidFill>
+              <a:prstDash val="dash"/>
             </a:ln>
             <a:effectLst/>
           </p:spPr>
@@ -8550,74 +9863,43 @@
             <a:lstStyle/>
             <a:p>
               <a:pPr algn="ctr"/>
-              <a:r>
-                <a:rPr lang="en-US" sz="3200" b="1" dirty="0" smtClean="0">
-                  <a:solidFill>
-                    <a:schemeClr val="tx1"/>
-                  </a:solidFill>
-                </a:rPr>
-                <a:t>NAT</a:t>
-              </a:r>
-              <a:endParaRPr lang="en-US" b="1" dirty="0">
+              <a:endParaRPr lang="en-US" dirty="0" smtClean="0"/>
+            </a:p>
+            <a:p>
+              <a:pPr algn="ctr"/>
+              <a:endParaRPr lang="en-US" sz="1800" dirty="0">
                 <a:solidFill>
-                  <a:schemeClr val="tx1"/>
+                  <a:srgbClr val="000000"/>
                 </a:solidFill>
               </a:endParaRPr>
             </a:p>
-          </p:txBody>
-        </p:sp>
-        <p:sp>
-          <p:nvSpPr>
-            <p:cNvPr id="4" name="Rectangle 3"/>
-            <p:cNvSpPr/>
-            <p:nvPr/>
-          </p:nvSpPr>
-          <p:spPr>
-            <a:xfrm>
-              <a:off x="851301" y="977707"/>
-              <a:ext cx="2304779" cy="606853"/>
-            </a:xfrm>
-            <a:prstGeom prst="rect">
-              <a:avLst/>
-            </a:prstGeom>
-            <a:solidFill>
-              <a:schemeClr val="accent5"/>
-            </a:solidFill>
-            <a:ln w="19050">
-              <a:solidFill>
-                <a:schemeClr val="tx1"/>
-              </a:solidFill>
-            </a:ln>
-            <a:effectLst/>
-          </p:spPr>
-          <p:style>
-            <a:lnRef idx="1">
-              <a:schemeClr val="accent1"/>
-            </a:lnRef>
-            <a:fillRef idx="3">
-              <a:schemeClr val="accent1"/>
-            </a:fillRef>
-            <a:effectRef idx="2">
-              <a:schemeClr val="accent1"/>
-            </a:effectRef>
-            <a:fontRef idx="minor">
-              <a:schemeClr val="lt1"/>
-            </a:fontRef>
-          </p:style>
-          <p:txBody>
-            <a:bodyPr rtlCol="0" anchor="ctr"/>
-            <a:lstStyle/>
+            <a:p>
+              <a:pPr algn="ctr"/>
+              <a:endParaRPr lang="en-US" sz="1800" dirty="0">
+                <a:solidFill>
+                  <a:srgbClr val="000000"/>
+                </a:solidFill>
+              </a:endParaRPr>
+            </a:p>
+            <a:p>
+              <a:pPr algn="ctr"/>
+              <a:endParaRPr lang="en-US" sz="1800" dirty="0">
+                <a:solidFill>
+                  <a:srgbClr val="000000"/>
+                </a:solidFill>
+              </a:endParaRPr>
+            </a:p>
             <a:p>
               <a:pPr algn="ctr"/>
               <a:r>
-                <a:rPr lang="en-US" sz="3600" b="1" dirty="0" smtClean="0">
+                <a:rPr lang="en-US" sz="1800" b="1" dirty="0" smtClean="0">
                   <a:solidFill>
                     <a:srgbClr val="000000"/>
                   </a:solidFill>
                 </a:rPr>
-                <a:t>Clone Manager</a:t>
+                <a:t>IP namespace 1</a:t>
               </a:r>
-              <a:endParaRPr lang="en-US" sz="3600" b="1" dirty="0">
+              <a:endParaRPr lang="en-US" sz="1800" b="1" dirty="0">
                 <a:solidFill>
                   <a:srgbClr val="000000"/>
                 </a:solidFill>
@@ -8625,1288 +9907,7 @@
             </a:p>
           </p:txBody>
         </p:sp>
-        <p:cxnSp>
-          <p:nvCxnSpPr>
-            <p:cNvPr id="12" name="Straight Arrow Connector 11"/>
-            <p:cNvCxnSpPr>
-              <a:stCxn id="4" idx="2"/>
-              <a:endCxn id="7" idx="0"/>
-            </p:cNvCxnSpPr>
-            <p:nvPr/>
-          </p:nvCxnSpPr>
-          <p:spPr>
-            <a:xfrm flipH="1">
-              <a:off x="1313500" y="1584560"/>
-              <a:ext cx="690191" cy="337141"/>
-            </a:xfrm>
-            <a:prstGeom prst="straightConnector1">
-              <a:avLst/>
-            </a:prstGeom>
-            <a:ln w="19050">
-              <a:solidFill>
-                <a:schemeClr val="tx1"/>
-              </a:solidFill>
-              <a:prstDash val="dash"/>
-              <a:tailEnd type="arrow"/>
-            </a:ln>
-            <a:effectLst/>
-          </p:spPr>
-          <p:style>
-            <a:lnRef idx="2">
-              <a:schemeClr val="accent1"/>
-            </a:lnRef>
-            <a:fillRef idx="0">
-              <a:schemeClr val="accent1"/>
-            </a:fillRef>
-            <a:effectRef idx="1">
-              <a:schemeClr val="accent1"/>
-            </a:effectRef>
-            <a:fontRef idx="minor">
-              <a:schemeClr val="tx1"/>
-            </a:fontRef>
-          </p:style>
-        </p:cxnSp>
-        <p:cxnSp>
-          <p:nvCxnSpPr>
-            <p:cNvPr id="40" name="Straight Arrow Connector 39"/>
-            <p:cNvCxnSpPr>
-              <a:stCxn id="4" idx="2"/>
-              <a:endCxn id="31" idx="0"/>
-            </p:cNvCxnSpPr>
-            <p:nvPr/>
-          </p:nvCxnSpPr>
-          <p:spPr>
-            <a:xfrm>
-              <a:off x="2003691" y="1584560"/>
-              <a:ext cx="705128" cy="337141"/>
-            </a:xfrm>
-            <a:prstGeom prst="straightConnector1">
-              <a:avLst/>
-            </a:prstGeom>
-            <a:ln w="19050">
-              <a:solidFill>
-                <a:schemeClr val="tx1"/>
-              </a:solidFill>
-              <a:prstDash val="dash"/>
-              <a:tailEnd type="arrow"/>
-            </a:ln>
-            <a:effectLst/>
-          </p:spPr>
-          <p:style>
-            <a:lnRef idx="2">
-              <a:schemeClr val="accent1"/>
-            </a:lnRef>
-            <a:fillRef idx="0">
-              <a:schemeClr val="accent1"/>
-            </a:fillRef>
-            <a:effectRef idx="1">
-              <a:schemeClr val="accent1"/>
-            </a:effectRef>
-            <a:fontRef idx="minor">
-              <a:schemeClr val="tx1"/>
-            </a:fontRef>
-          </p:style>
-        </p:cxnSp>
-        <p:sp>
-          <p:nvSpPr>
-            <p:cNvPr id="23" name="Rectangle 22"/>
-            <p:cNvSpPr/>
-            <p:nvPr/>
-          </p:nvSpPr>
-          <p:spPr>
-            <a:xfrm>
-              <a:off x="811423" y="2034081"/>
-              <a:ext cx="982982" cy="370855"/>
-            </a:xfrm>
-            <a:prstGeom prst="rect">
-              <a:avLst/>
-            </a:prstGeom>
-            <a:solidFill>
-              <a:schemeClr val="tx2">
-                <a:lumMod val="40000"/>
-                <a:lumOff val="60000"/>
-              </a:schemeClr>
-            </a:solidFill>
-            <a:ln w="19050">
-              <a:solidFill>
-                <a:schemeClr val="tx1"/>
-              </a:solidFill>
-            </a:ln>
-            <a:effectLst/>
-          </p:spPr>
-          <p:style>
-            <a:lnRef idx="1">
-              <a:schemeClr val="accent1"/>
-            </a:lnRef>
-            <a:fillRef idx="3">
-              <a:schemeClr val="accent1"/>
-            </a:fillRef>
-            <a:effectRef idx="2">
-              <a:schemeClr val="accent1"/>
-            </a:effectRef>
-            <a:fontRef idx="minor">
-              <a:schemeClr val="lt1"/>
-            </a:fontRef>
-          </p:style>
-          <p:txBody>
-            <a:bodyPr rtlCol="0" anchor="ctr"/>
-            <a:lstStyle/>
-            <a:p>
-              <a:pPr algn="ctr"/>
-              <a:r>
-                <a:rPr lang="en-US" sz="3200" b="1" dirty="0" smtClean="0">
-                  <a:solidFill>
-                    <a:srgbClr val="000000"/>
-                  </a:solidFill>
-                </a:rPr>
-                <a:t>Agent</a:t>
-              </a:r>
-              <a:endParaRPr lang="en-US" sz="3200" b="1" dirty="0">
-                <a:solidFill>
-                  <a:srgbClr val="000000"/>
-                </a:solidFill>
-              </a:endParaRPr>
-            </a:p>
-          </p:txBody>
-        </p:sp>
-        <p:sp>
-          <p:nvSpPr>
-            <p:cNvPr id="52" name="Rectangle 51"/>
-            <p:cNvSpPr/>
-            <p:nvPr/>
-          </p:nvSpPr>
-          <p:spPr>
-            <a:xfrm>
-              <a:off x="2254089" y="2034081"/>
-              <a:ext cx="909460" cy="370855"/>
-            </a:xfrm>
-            <a:prstGeom prst="rect">
-              <a:avLst/>
-            </a:prstGeom>
-            <a:solidFill>
-              <a:schemeClr val="tx2">
-                <a:lumMod val="40000"/>
-                <a:lumOff val="60000"/>
-              </a:schemeClr>
-            </a:solidFill>
-            <a:ln w="19050">
-              <a:solidFill>
-                <a:schemeClr val="tx1"/>
-              </a:solidFill>
-            </a:ln>
-            <a:effectLst/>
-          </p:spPr>
-          <p:style>
-            <a:lnRef idx="1">
-              <a:schemeClr val="accent1"/>
-            </a:lnRef>
-            <a:fillRef idx="3">
-              <a:schemeClr val="accent1"/>
-            </a:fillRef>
-            <a:effectRef idx="2">
-              <a:schemeClr val="accent1"/>
-            </a:effectRef>
-            <a:fontRef idx="minor">
-              <a:schemeClr val="lt1"/>
-            </a:fontRef>
-          </p:style>
-          <p:txBody>
-            <a:bodyPr rtlCol="0" anchor="ctr"/>
-            <a:lstStyle/>
-            <a:p>
-              <a:pPr algn="ctr"/>
-              <a:r>
-                <a:rPr lang="en-US" sz="3200" b="1" dirty="0" smtClean="0">
-                  <a:solidFill>
-                    <a:srgbClr val="000000"/>
-                  </a:solidFill>
-                </a:rPr>
-                <a:t>Agent</a:t>
-              </a:r>
-              <a:endParaRPr lang="en-US" sz="3200" b="1" dirty="0">
-                <a:solidFill>
-                  <a:srgbClr val="000000"/>
-                </a:solidFill>
-              </a:endParaRPr>
-            </a:p>
-          </p:txBody>
-        </p:sp>
-        <p:cxnSp>
-          <p:nvCxnSpPr>
-            <p:cNvPr id="69" name="Straight Arrow Connector 68"/>
-            <p:cNvCxnSpPr/>
-            <p:nvPr/>
-          </p:nvCxnSpPr>
-          <p:spPr>
-            <a:xfrm>
-              <a:off x="1311460" y="3906022"/>
-              <a:ext cx="2040" cy="337141"/>
-            </a:xfrm>
-            <a:prstGeom prst="straightConnector1">
-              <a:avLst/>
-            </a:prstGeom>
-            <a:ln w="19050">
-              <a:solidFill>
-                <a:schemeClr val="tx1"/>
-              </a:solidFill>
-              <a:prstDash val="solid"/>
-              <a:tailEnd type="arrow"/>
-            </a:ln>
-            <a:effectLst/>
-          </p:spPr>
-          <p:style>
-            <a:lnRef idx="2">
-              <a:schemeClr val="accent1"/>
-            </a:lnRef>
-            <a:fillRef idx="0">
-              <a:schemeClr val="accent1"/>
-            </a:fillRef>
-            <a:effectRef idx="1">
-              <a:schemeClr val="accent1"/>
-            </a:effectRef>
-            <a:fontRef idx="minor">
-              <a:schemeClr val="tx1"/>
-            </a:fontRef>
-          </p:style>
-        </p:cxnSp>
-        <p:cxnSp>
-          <p:nvCxnSpPr>
-            <p:cNvPr id="70" name="Straight Arrow Connector 69"/>
-            <p:cNvCxnSpPr/>
-            <p:nvPr/>
-          </p:nvCxnSpPr>
-          <p:spPr>
-            <a:xfrm>
-              <a:off x="2716555" y="3922192"/>
-              <a:ext cx="2040" cy="337141"/>
-            </a:xfrm>
-            <a:prstGeom prst="straightConnector1">
-              <a:avLst/>
-            </a:prstGeom>
-            <a:ln w="19050">
-              <a:solidFill>
-                <a:schemeClr val="tx1"/>
-              </a:solidFill>
-              <a:prstDash val="solid"/>
-              <a:tailEnd type="arrow"/>
-            </a:ln>
-            <a:effectLst/>
-          </p:spPr>
-          <p:style>
-            <a:lnRef idx="2">
-              <a:schemeClr val="accent1"/>
-            </a:lnRef>
-            <a:fillRef idx="0">
-              <a:schemeClr val="accent1"/>
-            </a:fillRef>
-            <a:effectRef idx="1">
-              <a:schemeClr val="accent1"/>
-            </a:effectRef>
-            <a:fontRef idx="minor">
-              <a:schemeClr val="tx1"/>
-            </a:fontRef>
-          </p:style>
-        </p:cxnSp>
-        <p:sp>
-          <p:nvSpPr>
-            <p:cNvPr id="2" name="TextBox 1"/>
-            <p:cNvSpPr txBox="1"/>
-            <p:nvPr/>
-          </p:nvSpPr>
-          <p:spPr>
-            <a:xfrm>
-              <a:off x="720137" y="4253748"/>
-              <a:ext cx="2582044" cy="329760"/>
-            </a:xfrm>
-            <a:prstGeom prst="rect">
-              <a:avLst/>
-            </a:prstGeom>
-            <a:noFill/>
-            <a:ln w="19050">
-              <a:noFill/>
-            </a:ln>
-          </p:spPr>
-          <p:txBody>
-            <a:bodyPr wrap="square" rtlCol="0">
-              <a:spAutoFit/>
-            </a:bodyPr>
-            <a:lstStyle/>
-            <a:p>
-              <a:pPr algn="ctr"/>
-              <a:r>
-                <a:rPr lang="en-US" sz="2400" b="1" dirty="0"/>
-                <a:t>To/From Duplicator</a:t>
-              </a:r>
-            </a:p>
-          </p:txBody>
-        </p:sp>
       </p:grpSp>
-      <p:grpSp>
-        <p:nvGrpSpPr>
-          <p:cNvPr id="6" name="Group 5"/>
-          <p:cNvGrpSpPr/>
-          <p:nvPr/>
-        </p:nvGrpSpPr>
-        <p:grpSpPr>
-          <a:xfrm>
-            <a:off x="4865459" y="1368791"/>
-            <a:ext cx="3740746" cy="5048121"/>
-            <a:chOff x="4277825" y="961537"/>
-            <a:chExt cx="2671956" cy="3605800"/>
-          </a:xfrm>
-        </p:grpSpPr>
-        <p:sp>
-          <p:nvSpPr>
-            <p:cNvPr id="53" name="Rounded Rectangle 52"/>
-            <p:cNvSpPr/>
-            <p:nvPr/>
-          </p:nvSpPr>
-          <p:spPr>
-            <a:xfrm>
-              <a:off x="4277825" y="1905531"/>
-              <a:ext cx="2671956" cy="2000491"/>
-            </a:xfrm>
-            <a:prstGeom prst="roundRect">
-              <a:avLst>
-                <a:gd name="adj" fmla="val 7797"/>
-              </a:avLst>
-            </a:prstGeom>
-            <a:solidFill>
-              <a:schemeClr val="bg1">
-                <a:lumMod val="85000"/>
-              </a:schemeClr>
-            </a:solidFill>
-            <a:ln w="19050" cmpd="sng">
-              <a:solidFill>
-                <a:schemeClr val="tx1"/>
-              </a:solidFill>
-            </a:ln>
-            <a:effectLst/>
-          </p:spPr>
-          <p:style>
-            <a:lnRef idx="1">
-              <a:schemeClr val="accent1"/>
-            </a:lnRef>
-            <a:fillRef idx="3">
-              <a:schemeClr val="accent1"/>
-            </a:fillRef>
-            <a:effectRef idx="2">
-              <a:schemeClr val="accent1"/>
-            </a:effectRef>
-            <a:fontRef idx="minor">
-              <a:schemeClr val="lt1"/>
-            </a:fontRef>
-          </p:style>
-          <p:txBody>
-            <a:bodyPr anchor="ctr"/>
-            <a:lstStyle/>
-            <a:p>
-              <a:pPr algn="ctr">
-                <a:defRPr/>
-              </a:pPr>
-              <a:endParaRPr lang="en-US">
-                <a:solidFill>
-                  <a:srgbClr val="FFFFFF"/>
-                </a:solidFill>
-                <a:latin typeface="Arial"/>
-                <a:ea typeface="ＭＳ Ｐゴシック"/>
-              </a:endParaRPr>
-            </a:p>
-          </p:txBody>
-        </p:sp>
-        <p:sp>
-          <p:nvSpPr>
-            <p:cNvPr id="54" name="Rounded Rectangle 53"/>
-            <p:cNvSpPr/>
-            <p:nvPr/>
-          </p:nvSpPr>
-          <p:spPr>
-            <a:xfrm>
-              <a:off x="4487664" y="2602287"/>
-              <a:ext cx="909460" cy="831737"/>
-            </a:xfrm>
-            <a:prstGeom prst="roundRect">
-              <a:avLst/>
-            </a:prstGeom>
-            <a:solidFill>
-              <a:srgbClr val="FF6600"/>
-            </a:solidFill>
-            <a:ln w="19050">
-              <a:solidFill>
-                <a:srgbClr val="000000"/>
-              </a:solidFill>
-            </a:ln>
-            <a:effectLst/>
-          </p:spPr>
-          <p:style>
-            <a:lnRef idx="1">
-              <a:schemeClr val="accent1"/>
-            </a:lnRef>
-            <a:fillRef idx="3">
-              <a:schemeClr val="accent1"/>
-            </a:fillRef>
-            <a:effectRef idx="2">
-              <a:schemeClr val="accent1"/>
-            </a:effectRef>
-            <a:fontRef idx="minor">
-              <a:schemeClr val="lt1"/>
-            </a:fontRef>
-          </p:style>
-          <p:txBody>
-            <a:bodyPr anchor="ctr"/>
-            <a:lstStyle>
-              <a:lvl1pPr>
-                <a:defRPr>
-                  <a:solidFill>
-                    <a:schemeClr val="lt1"/>
-                  </a:solidFill>
-                  <a:latin typeface="+mn-lt"/>
-                  <a:ea typeface="+mn-ea"/>
-                  <a:cs typeface="+mn-cs"/>
-                </a:defRPr>
-              </a:lvl1pPr>
-              <a:lvl2pPr>
-                <a:defRPr>
-                  <a:solidFill>
-                    <a:schemeClr val="lt1"/>
-                  </a:solidFill>
-                  <a:latin typeface="+mn-lt"/>
-                  <a:ea typeface="+mn-ea"/>
-                  <a:cs typeface="+mn-cs"/>
-                </a:defRPr>
-              </a:lvl2pPr>
-              <a:lvl3pPr>
-                <a:defRPr>
-                  <a:solidFill>
-                    <a:schemeClr val="lt1"/>
-                  </a:solidFill>
-                  <a:latin typeface="+mn-lt"/>
-                  <a:ea typeface="+mn-ea"/>
-                  <a:cs typeface="+mn-cs"/>
-                </a:defRPr>
-              </a:lvl3pPr>
-              <a:lvl4pPr>
-                <a:defRPr>
-                  <a:solidFill>
-                    <a:schemeClr val="lt1"/>
-                  </a:solidFill>
-                  <a:latin typeface="+mn-lt"/>
-                  <a:ea typeface="+mn-ea"/>
-                  <a:cs typeface="+mn-cs"/>
-                </a:defRPr>
-              </a:lvl4pPr>
-              <a:lvl5pPr>
-                <a:defRPr>
-                  <a:solidFill>
-                    <a:schemeClr val="lt1"/>
-                  </a:solidFill>
-                  <a:latin typeface="+mn-lt"/>
-                  <a:ea typeface="+mn-ea"/>
-                  <a:cs typeface="+mn-cs"/>
-                </a:defRPr>
-              </a:lvl5pPr>
-              <a:lvl6pPr>
-                <a:defRPr>
-                  <a:solidFill>
-                    <a:schemeClr val="lt1"/>
-                  </a:solidFill>
-                  <a:latin typeface="+mn-lt"/>
-                  <a:ea typeface="+mn-ea"/>
-                  <a:cs typeface="+mn-cs"/>
-                </a:defRPr>
-              </a:lvl6pPr>
-              <a:lvl7pPr>
-                <a:defRPr>
-                  <a:solidFill>
-                    <a:schemeClr val="lt1"/>
-                  </a:solidFill>
-                  <a:latin typeface="+mn-lt"/>
-                  <a:ea typeface="+mn-ea"/>
-                  <a:cs typeface="+mn-cs"/>
-                </a:defRPr>
-              </a:lvl7pPr>
-              <a:lvl8pPr>
-                <a:defRPr>
-                  <a:solidFill>
-                    <a:schemeClr val="lt1"/>
-                  </a:solidFill>
-                  <a:latin typeface="+mn-lt"/>
-                  <a:ea typeface="+mn-ea"/>
-                  <a:cs typeface="+mn-cs"/>
-                </a:defRPr>
-              </a:lvl8pPr>
-              <a:lvl9pPr>
-                <a:defRPr>
-                  <a:solidFill>
-                    <a:schemeClr val="lt1"/>
-                  </a:solidFill>
-                  <a:latin typeface="+mn-lt"/>
-                  <a:ea typeface="+mn-ea"/>
-                  <a:cs typeface="+mn-cs"/>
-                </a:defRPr>
-              </a:lvl9pPr>
-            </a:lstStyle>
-            <a:p>
-              <a:pPr algn="ctr">
-                <a:defRPr/>
-              </a:pPr>
-              <a:r>
-                <a:rPr lang="en-US" sz="3200" b="1" kern="1200" dirty="0" smtClean="0">
-                  <a:solidFill>
-                    <a:srgbClr val="000000"/>
-                  </a:solidFill>
-                  <a:latin typeface="Arial"/>
-                  <a:ea typeface="ＭＳ Ｐゴシック"/>
-                </a:rPr>
-                <a:t>P1</a:t>
-              </a:r>
-              <a:endParaRPr lang="en-US" b="1" kern="1200" dirty="0">
-                <a:solidFill>
-                  <a:srgbClr val="000000"/>
-                </a:solidFill>
-                <a:latin typeface="Arial"/>
-                <a:ea typeface="ＭＳ Ｐゴシック"/>
-              </a:endParaRPr>
-            </a:p>
-          </p:txBody>
-        </p:sp>
-        <p:sp>
-          <p:nvSpPr>
-            <p:cNvPr id="57" name="Rounded Rectangle 56"/>
-            <p:cNvSpPr/>
-            <p:nvPr/>
-          </p:nvSpPr>
-          <p:spPr>
-            <a:xfrm>
-              <a:off x="5822453" y="2608592"/>
-              <a:ext cx="909460" cy="820500"/>
-            </a:xfrm>
-            <a:prstGeom prst="roundRect">
-              <a:avLst/>
-            </a:prstGeom>
-            <a:solidFill>
-              <a:srgbClr val="FF6600"/>
-            </a:solidFill>
-            <a:ln w="19050">
-              <a:solidFill>
-                <a:srgbClr val="000000"/>
-              </a:solidFill>
-            </a:ln>
-            <a:effectLst/>
-          </p:spPr>
-          <p:style>
-            <a:lnRef idx="1">
-              <a:schemeClr val="accent1"/>
-            </a:lnRef>
-            <a:fillRef idx="3">
-              <a:schemeClr val="accent1"/>
-            </a:fillRef>
-            <a:effectRef idx="2">
-              <a:schemeClr val="accent1"/>
-            </a:effectRef>
-            <a:fontRef idx="minor">
-              <a:schemeClr val="lt1"/>
-            </a:fontRef>
-          </p:style>
-          <p:txBody>
-            <a:bodyPr anchor="ctr"/>
-            <a:lstStyle>
-              <a:lvl1pPr>
-                <a:defRPr>
-                  <a:solidFill>
-                    <a:schemeClr val="lt1"/>
-                  </a:solidFill>
-                  <a:latin typeface="+mn-lt"/>
-                  <a:ea typeface="+mn-ea"/>
-                  <a:cs typeface="+mn-cs"/>
-                </a:defRPr>
-              </a:lvl1pPr>
-              <a:lvl2pPr>
-                <a:defRPr>
-                  <a:solidFill>
-                    <a:schemeClr val="lt1"/>
-                  </a:solidFill>
-                  <a:latin typeface="+mn-lt"/>
-                  <a:ea typeface="+mn-ea"/>
-                  <a:cs typeface="+mn-cs"/>
-                </a:defRPr>
-              </a:lvl2pPr>
-              <a:lvl3pPr>
-                <a:defRPr>
-                  <a:solidFill>
-                    <a:schemeClr val="lt1"/>
-                  </a:solidFill>
-                  <a:latin typeface="+mn-lt"/>
-                  <a:ea typeface="+mn-ea"/>
-                  <a:cs typeface="+mn-cs"/>
-                </a:defRPr>
-              </a:lvl3pPr>
-              <a:lvl4pPr>
-                <a:defRPr>
-                  <a:solidFill>
-                    <a:schemeClr val="lt1"/>
-                  </a:solidFill>
-                  <a:latin typeface="+mn-lt"/>
-                  <a:ea typeface="+mn-ea"/>
-                  <a:cs typeface="+mn-cs"/>
-                </a:defRPr>
-              </a:lvl4pPr>
-              <a:lvl5pPr>
-                <a:defRPr>
-                  <a:solidFill>
-                    <a:schemeClr val="lt1"/>
-                  </a:solidFill>
-                  <a:latin typeface="+mn-lt"/>
-                  <a:ea typeface="+mn-ea"/>
-                  <a:cs typeface="+mn-cs"/>
-                </a:defRPr>
-              </a:lvl5pPr>
-              <a:lvl6pPr>
-                <a:defRPr>
-                  <a:solidFill>
-                    <a:schemeClr val="lt1"/>
-                  </a:solidFill>
-                  <a:latin typeface="+mn-lt"/>
-                  <a:ea typeface="+mn-ea"/>
-                  <a:cs typeface="+mn-cs"/>
-                </a:defRPr>
-              </a:lvl6pPr>
-              <a:lvl7pPr>
-                <a:defRPr>
-                  <a:solidFill>
-                    <a:schemeClr val="lt1"/>
-                  </a:solidFill>
-                  <a:latin typeface="+mn-lt"/>
-                  <a:ea typeface="+mn-ea"/>
-                  <a:cs typeface="+mn-cs"/>
-                </a:defRPr>
-              </a:lvl7pPr>
-              <a:lvl8pPr>
-                <a:defRPr>
-                  <a:solidFill>
-                    <a:schemeClr val="lt1"/>
-                  </a:solidFill>
-                  <a:latin typeface="+mn-lt"/>
-                  <a:ea typeface="+mn-ea"/>
-                  <a:cs typeface="+mn-cs"/>
-                </a:defRPr>
-              </a:lvl8pPr>
-              <a:lvl9pPr>
-                <a:defRPr>
-                  <a:solidFill>
-                    <a:schemeClr val="lt1"/>
-                  </a:solidFill>
-                  <a:latin typeface="+mn-lt"/>
-                  <a:ea typeface="+mn-ea"/>
-                  <a:cs typeface="+mn-cs"/>
-                </a:defRPr>
-              </a:lvl9pPr>
-            </a:lstStyle>
-            <a:p>
-              <a:pPr algn="ctr">
-                <a:defRPr/>
-              </a:pPr>
-              <a:r>
-                <a:rPr lang="en-US" sz="3200" b="1" dirty="0" smtClean="0">
-                  <a:solidFill>
-                    <a:srgbClr val="000000"/>
-                  </a:solidFill>
-                  <a:latin typeface="Arial"/>
-                  <a:ea typeface="ＭＳ Ｐゴシック"/>
-                </a:rPr>
-                <a:t>T1</a:t>
-              </a:r>
-              <a:endParaRPr lang="en-US" b="1" kern="1200" dirty="0">
-                <a:solidFill>
-                  <a:srgbClr val="000000"/>
-                </a:solidFill>
-                <a:latin typeface="Arial"/>
-                <a:ea typeface="ＭＳ Ｐゴシック"/>
-              </a:endParaRPr>
-            </a:p>
-          </p:txBody>
-        </p:sp>
-        <p:sp>
-          <p:nvSpPr>
-            <p:cNvPr id="59" name="Rectangle 58"/>
-            <p:cNvSpPr/>
-            <p:nvPr/>
-          </p:nvSpPr>
-          <p:spPr>
-            <a:xfrm>
-              <a:off x="4317693" y="961537"/>
-              <a:ext cx="2582039" cy="606853"/>
-            </a:xfrm>
-            <a:prstGeom prst="rect">
-              <a:avLst/>
-            </a:prstGeom>
-            <a:solidFill>
-              <a:schemeClr val="accent5"/>
-            </a:solidFill>
-            <a:ln w="19050">
-              <a:solidFill>
-                <a:schemeClr val="tx1"/>
-              </a:solidFill>
-            </a:ln>
-            <a:effectLst/>
-          </p:spPr>
-          <p:style>
-            <a:lnRef idx="1">
-              <a:schemeClr val="accent1"/>
-            </a:lnRef>
-            <a:fillRef idx="3">
-              <a:schemeClr val="accent1"/>
-            </a:fillRef>
-            <a:effectRef idx="2">
-              <a:schemeClr val="accent1"/>
-            </a:effectRef>
-            <a:fontRef idx="minor">
-              <a:schemeClr val="lt1"/>
-            </a:fontRef>
-          </p:style>
-          <p:txBody>
-            <a:bodyPr rtlCol="0" anchor="ctr"/>
-            <a:lstStyle/>
-            <a:p>
-              <a:pPr algn="ctr"/>
-              <a:r>
-                <a:rPr lang="en-US" sz="3600" b="1" dirty="0" smtClean="0">
-                  <a:solidFill>
-                    <a:srgbClr val="000000"/>
-                  </a:solidFill>
-                </a:rPr>
-                <a:t>Clone Manager</a:t>
-              </a:r>
-              <a:endParaRPr lang="en-US" sz="3600" b="1" dirty="0">
-                <a:solidFill>
-                  <a:srgbClr val="000000"/>
-                </a:solidFill>
-              </a:endParaRPr>
-            </a:p>
-          </p:txBody>
-        </p:sp>
-        <p:cxnSp>
-          <p:nvCxnSpPr>
-            <p:cNvPr id="60" name="Straight Arrow Connector 59"/>
-            <p:cNvCxnSpPr>
-              <a:stCxn id="59" idx="2"/>
-              <a:endCxn id="53" idx="0"/>
-            </p:cNvCxnSpPr>
-            <p:nvPr/>
-          </p:nvCxnSpPr>
-          <p:spPr>
-            <a:xfrm>
-              <a:off x="5608712" y="1568390"/>
-              <a:ext cx="5091" cy="337141"/>
-            </a:xfrm>
-            <a:prstGeom prst="straightConnector1">
-              <a:avLst/>
-            </a:prstGeom>
-            <a:ln w="19050">
-              <a:solidFill>
-                <a:schemeClr val="tx1"/>
-              </a:solidFill>
-              <a:prstDash val="dash"/>
-              <a:tailEnd type="arrow"/>
-            </a:ln>
-            <a:effectLst/>
-          </p:spPr>
-          <p:style>
-            <a:lnRef idx="2">
-              <a:schemeClr val="accent1"/>
-            </a:lnRef>
-            <a:fillRef idx="0">
-              <a:schemeClr val="accent1"/>
-            </a:fillRef>
-            <a:effectRef idx="1">
-              <a:schemeClr val="accent1"/>
-            </a:effectRef>
-            <a:fontRef idx="minor">
-              <a:schemeClr val="tx1"/>
-            </a:fontRef>
-          </p:style>
-        </p:cxnSp>
-        <p:sp>
-          <p:nvSpPr>
-            <p:cNvPr id="63" name="Rectangle 62"/>
-            <p:cNvSpPr/>
-            <p:nvPr/>
-          </p:nvSpPr>
-          <p:spPr>
-            <a:xfrm>
-              <a:off x="4498902" y="2017911"/>
-              <a:ext cx="2322923" cy="370855"/>
-            </a:xfrm>
-            <a:prstGeom prst="rect">
-              <a:avLst/>
-            </a:prstGeom>
-            <a:solidFill>
-              <a:schemeClr val="tx2">
-                <a:lumMod val="40000"/>
-                <a:lumOff val="60000"/>
-              </a:schemeClr>
-            </a:solidFill>
-            <a:ln w="19050">
-              <a:solidFill>
-                <a:schemeClr val="tx1"/>
-              </a:solidFill>
-            </a:ln>
-            <a:effectLst/>
-          </p:spPr>
-          <p:style>
-            <a:lnRef idx="1">
-              <a:schemeClr val="accent1"/>
-            </a:lnRef>
-            <a:fillRef idx="3">
-              <a:schemeClr val="accent1"/>
-            </a:fillRef>
-            <a:effectRef idx="2">
-              <a:schemeClr val="accent1"/>
-            </a:effectRef>
-            <a:fontRef idx="minor">
-              <a:schemeClr val="lt1"/>
-            </a:fontRef>
-          </p:style>
-          <p:txBody>
-            <a:bodyPr rtlCol="0" anchor="ctr"/>
-            <a:lstStyle/>
-            <a:p>
-              <a:pPr algn="ctr"/>
-              <a:r>
-                <a:rPr lang="en-US" sz="3200" b="1" dirty="0" smtClean="0">
-                  <a:solidFill>
-                    <a:srgbClr val="000000"/>
-                  </a:solidFill>
-                </a:rPr>
-                <a:t>Agent</a:t>
-              </a:r>
-              <a:endParaRPr lang="en-US" b="1" dirty="0">
-                <a:solidFill>
-                  <a:srgbClr val="000000"/>
-                </a:solidFill>
-              </a:endParaRPr>
-            </a:p>
-          </p:txBody>
-        </p:sp>
-        <p:cxnSp>
-          <p:nvCxnSpPr>
-            <p:cNvPr id="71" name="Straight Arrow Connector 70"/>
-            <p:cNvCxnSpPr/>
-            <p:nvPr/>
-          </p:nvCxnSpPr>
-          <p:spPr>
-            <a:xfrm>
-              <a:off x="4945786" y="3910954"/>
-              <a:ext cx="2040" cy="337141"/>
-            </a:xfrm>
-            <a:prstGeom prst="straightConnector1">
-              <a:avLst/>
-            </a:prstGeom>
-            <a:ln w="19050">
-              <a:solidFill>
-                <a:schemeClr val="tx1"/>
-              </a:solidFill>
-              <a:prstDash val="solid"/>
-              <a:tailEnd type="arrow"/>
-            </a:ln>
-            <a:effectLst/>
-          </p:spPr>
-          <p:style>
-            <a:lnRef idx="2">
-              <a:schemeClr val="accent1"/>
-            </a:lnRef>
-            <a:fillRef idx="0">
-              <a:schemeClr val="accent1"/>
-            </a:fillRef>
-            <a:effectRef idx="1">
-              <a:schemeClr val="accent1"/>
-            </a:effectRef>
-            <a:fontRef idx="minor">
-              <a:schemeClr val="tx1"/>
-            </a:fontRef>
-          </p:style>
-        </p:cxnSp>
-        <p:cxnSp>
-          <p:nvCxnSpPr>
-            <p:cNvPr id="72" name="Straight Arrow Connector 71"/>
-            <p:cNvCxnSpPr/>
-            <p:nvPr/>
-          </p:nvCxnSpPr>
-          <p:spPr>
-            <a:xfrm>
-              <a:off x="6226985" y="3910954"/>
-              <a:ext cx="2040" cy="337141"/>
-            </a:xfrm>
-            <a:prstGeom prst="straightConnector1">
-              <a:avLst/>
-            </a:prstGeom>
-            <a:ln w="19050">
-              <a:solidFill>
-                <a:schemeClr val="tx1"/>
-              </a:solidFill>
-              <a:prstDash val="solid"/>
-              <a:tailEnd type="arrow"/>
-            </a:ln>
-            <a:effectLst/>
-          </p:spPr>
-          <p:style>
-            <a:lnRef idx="2">
-              <a:schemeClr val="accent1"/>
-            </a:lnRef>
-            <a:fillRef idx="0">
-              <a:schemeClr val="accent1"/>
-            </a:fillRef>
-            <a:effectRef idx="1">
-              <a:schemeClr val="accent1"/>
-            </a:effectRef>
-            <a:fontRef idx="minor">
-              <a:schemeClr val="tx1"/>
-            </a:fontRef>
-          </p:style>
-        </p:cxnSp>
-        <p:sp>
-          <p:nvSpPr>
-            <p:cNvPr id="28" name="TextBox 27"/>
-            <p:cNvSpPr txBox="1"/>
-            <p:nvPr/>
-          </p:nvSpPr>
-          <p:spPr>
-            <a:xfrm>
-              <a:off x="4277825" y="4237576"/>
-              <a:ext cx="2671956" cy="329761"/>
-            </a:xfrm>
-            <a:prstGeom prst="rect">
-              <a:avLst/>
-            </a:prstGeom>
-            <a:noFill/>
-            <a:ln w="19050">
-              <a:noFill/>
-            </a:ln>
-          </p:spPr>
-          <p:txBody>
-            <a:bodyPr wrap="square" rtlCol="0">
-              <a:spAutoFit/>
-            </a:bodyPr>
-            <a:lstStyle/>
-            <a:p>
-              <a:pPr algn="ctr"/>
-              <a:r>
-                <a:rPr lang="en-US" sz="2400" b="1" dirty="0"/>
-                <a:t>To/From Duplicator</a:t>
-              </a:r>
-            </a:p>
-          </p:txBody>
-        </p:sp>
-      </p:grpSp>
-      <p:cxnSp>
-        <p:nvCxnSpPr>
-          <p:cNvPr id="9" name="Straight Connector 8"/>
-          <p:cNvCxnSpPr/>
-          <p:nvPr/>
-        </p:nvCxnSpPr>
-        <p:spPr>
-          <a:xfrm>
-            <a:off x="4732648" y="725237"/>
-            <a:ext cx="0" cy="5356374"/>
-          </a:xfrm>
-          <a:prstGeom prst="line">
-            <a:avLst/>
-          </a:prstGeom>
-          <a:ln w="19050">
-            <a:solidFill>
-              <a:schemeClr val="tx1"/>
-            </a:solidFill>
-            <a:prstDash val="lgDash"/>
-          </a:ln>
-          <a:effectLst/>
-        </p:spPr>
-        <p:style>
-          <a:lnRef idx="2">
-            <a:schemeClr val="accent1"/>
-          </a:lnRef>
-          <a:fillRef idx="0">
-            <a:schemeClr val="accent1"/>
-          </a:fillRef>
-          <a:effectRef idx="1">
-            <a:schemeClr val="accent1"/>
-          </a:effectRef>
-          <a:fontRef idx="minor">
-            <a:schemeClr val="tx1"/>
-          </a:fontRef>
-        </p:style>
-      </p:cxnSp>
-      <p:sp>
-        <p:nvSpPr>
-          <p:cNvPr id="14" name="TextBox 13"/>
-          <p:cNvSpPr txBox="1"/>
-          <p:nvPr/>
-        </p:nvSpPr>
-        <p:spPr>
-          <a:xfrm>
-            <a:off x="1008192" y="561535"/>
-            <a:ext cx="3614862" cy="631625"/>
-          </a:xfrm>
-          <a:prstGeom prst="rect">
-            <a:avLst/>
-          </a:prstGeom>
-          <a:noFill/>
-          <a:ln w="19050">
-            <a:noFill/>
-          </a:ln>
-        </p:spPr>
-        <p:txBody>
-          <a:bodyPr wrap="square" lIns="137840" tIns="68918" rIns="137840" bIns="68918" rtlCol="0">
-            <a:spAutoFit/>
-          </a:bodyPr>
-          <a:lstStyle/>
-          <a:p>
-            <a:pPr algn="ctr"/>
-            <a:r>
-              <a:rPr lang="en-US" sz="3200" b="1" dirty="0" smtClean="0"/>
-              <a:t>External Mode</a:t>
-            </a:r>
-            <a:endParaRPr lang="en-US" sz="3200" b="1" dirty="0"/>
-          </a:p>
-        </p:txBody>
-      </p:sp>
-      <p:sp>
-        <p:nvSpPr>
-          <p:cNvPr id="35" name="TextBox 34"/>
-          <p:cNvSpPr txBox="1"/>
-          <p:nvPr/>
-        </p:nvSpPr>
-        <p:spPr>
-          <a:xfrm>
-            <a:off x="4865459" y="561535"/>
-            <a:ext cx="3740746" cy="631625"/>
-          </a:xfrm>
-          <a:prstGeom prst="rect">
-            <a:avLst/>
-          </a:prstGeom>
-          <a:noFill/>
-          <a:ln w="19050">
-            <a:noFill/>
-          </a:ln>
-        </p:spPr>
-        <p:txBody>
-          <a:bodyPr wrap="square" lIns="137840" tIns="68918" rIns="137840" bIns="68918" rtlCol="0">
-            <a:spAutoFit/>
-          </a:bodyPr>
-          <a:lstStyle/>
-          <a:p>
-            <a:pPr algn="ctr"/>
-            <a:r>
-              <a:rPr lang="en-US" sz="3200" b="1" dirty="0" smtClean="0"/>
-              <a:t>Internal Mode</a:t>
-            </a:r>
-            <a:endParaRPr lang="en-US" sz="3200" b="1" dirty="0"/>
-          </a:p>
-        </p:txBody>
-      </p:sp>
-      <p:cxnSp>
-        <p:nvCxnSpPr>
-          <p:cNvPr id="36" name="Straight Connector 35"/>
-          <p:cNvCxnSpPr/>
-          <p:nvPr/>
-        </p:nvCxnSpPr>
-        <p:spPr>
-          <a:xfrm>
-            <a:off x="1280149" y="1193595"/>
-            <a:ext cx="7146917" cy="0"/>
-          </a:xfrm>
-          <a:prstGeom prst="line">
-            <a:avLst/>
-          </a:prstGeom>
-          <a:ln w="19050">
-            <a:solidFill>
-              <a:schemeClr val="tx1"/>
-            </a:solidFill>
-            <a:prstDash val="solid"/>
-          </a:ln>
-          <a:effectLst/>
-        </p:spPr>
-        <p:style>
-          <a:lnRef idx="2">
-            <a:schemeClr val="accent1"/>
-          </a:lnRef>
-          <a:fillRef idx="0">
-            <a:schemeClr val="accent1"/>
-          </a:fillRef>
-          <a:effectRef idx="1">
-            <a:schemeClr val="accent1"/>
-          </a:effectRef>
-          <a:fontRef idx="minor">
-            <a:schemeClr val="tx1"/>
-          </a:fontRef>
-        </p:style>
-      </p:cxnSp>
-      <p:sp>
-        <p:nvSpPr>
-          <p:cNvPr id="34" name="Rectangle 33"/>
-          <p:cNvSpPr/>
-          <p:nvPr/>
-        </p:nvSpPr>
-        <p:spPr>
-          <a:xfrm>
-            <a:off x="6735832" y="3519463"/>
-            <a:ext cx="1800303" cy="1893148"/>
-          </a:xfrm>
-          <a:prstGeom prst="rect">
-            <a:avLst/>
-          </a:prstGeom>
-          <a:noFill/>
-          <a:ln w="19050">
-            <a:solidFill>
-              <a:schemeClr val="tx1"/>
-            </a:solidFill>
-            <a:prstDash val="dash"/>
-          </a:ln>
-          <a:effectLst/>
-        </p:spPr>
-        <p:style>
-          <a:lnRef idx="1">
-            <a:schemeClr val="accent1"/>
-          </a:lnRef>
-          <a:fillRef idx="3">
-            <a:schemeClr val="accent1"/>
-          </a:fillRef>
-          <a:effectRef idx="2">
-            <a:schemeClr val="accent1"/>
-          </a:effectRef>
-          <a:fontRef idx="minor">
-            <a:schemeClr val="lt1"/>
-          </a:fontRef>
-        </p:style>
-        <p:txBody>
-          <a:bodyPr rtlCol="0" anchor="ctr"/>
-          <a:lstStyle/>
-          <a:p>
-            <a:pPr algn="ctr"/>
-            <a:endParaRPr lang="en-US" dirty="0" smtClean="0"/>
-          </a:p>
-          <a:p>
-            <a:pPr algn="ctr"/>
-            <a:endParaRPr lang="en-US" sz="1800" dirty="0">
-              <a:solidFill>
-                <a:srgbClr val="000000"/>
-              </a:solidFill>
-            </a:endParaRPr>
-          </a:p>
-          <a:p>
-            <a:pPr algn="ctr"/>
-            <a:endParaRPr lang="en-US" sz="1800" dirty="0">
-              <a:solidFill>
-                <a:srgbClr val="000000"/>
-              </a:solidFill>
-            </a:endParaRPr>
-          </a:p>
-          <a:p>
-            <a:pPr algn="ctr"/>
-            <a:endParaRPr lang="en-US" sz="1800" dirty="0">
-              <a:solidFill>
-                <a:srgbClr val="000000"/>
-              </a:solidFill>
-            </a:endParaRPr>
-          </a:p>
-          <a:p>
-            <a:pPr algn="ctr"/>
-            <a:r>
-              <a:rPr lang="en-US" sz="1800" b="1" dirty="0">
-                <a:solidFill>
-                  <a:srgbClr val="000000"/>
-                </a:solidFill>
-              </a:rPr>
-              <a:t>IP namespace 2</a:t>
-            </a:r>
-          </a:p>
-        </p:txBody>
-      </p:sp>
-      <p:sp>
-        <p:nvSpPr>
-          <p:cNvPr id="37" name="Rectangle 36"/>
-          <p:cNvSpPr/>
-          <p:nvPr/>
-        </p:nvSpPr>
-        <p:spPr>
-          <a:xfrm>
-            <a:off x="4921274" y="3519463"/>
-            <a:ext cx="1807431" cy="1893148"/>
-          </a:xfrm>
-          <a:prstGeom prst="rect">
-            <a:avLst/>
-          </a:prstGeom>
-          <a:noFill/>
-          <a:ln w="19050">
-            <a:solidFill>
-              <a:schemeClr val="tx1"/>
-            </a:solidFill>
-            <a:prstDash val="dash"/>
-          </a:ln>
-          <a:effectLst/>
-        </p:spPr>
-        <p:style>
-          <a:lnRef idx="1">
-            <a:schemeClr val="accent1"/>
-          </a:lnRef>
-          <a:fillRef idx="3">
-            <a:schemeClr val="accent1"/>
-          </a:fillRef>
-          <a:effectRef idx="2">
-            <a:schemeClr val="accent1"/>
-          </a:effectRef>
-          <a:fontRef idx="minor">
-            <a:schemeClr val="lt1"/>
-          </a:fontRef>
-        </p:style>
-        <p:txBody>
-          <a:bodyPr rtlCol="0" anchor="ctr"/>
-          <a:lstStyle/>
-          <a:p>
-            <a:pPr algn="ctr"/>
-            <a:endParaRPr lang="en-US" dirty="0" smtClean="0"/>
-          </a:p>
-          <a:p>
-            <a:pPr algn="ctr"/>
-            <a:endParaRPr lang="en-US" sz="1800" dirty="0">
-              <a:solidFill>
-                <a:srgbClr val="000000"/>
-              </a:solidFill>
-            </a:endParaRPr>
-          </a:p>
-          <a:p>
-            <a:pPr algn="ctr"/>
-            <a:endParaRPr lang="en-US" sz="1800" dirty="0">
-              <a:solidFill>
-                <a:srgbClr val="000000"/>
-              </a:solidFill>
-            </a:endParaRPr>
-          </a:p>
-          <a:p>
-            <a:pPr algn="ctr"/>
-            <a:endParaRPr lang="en-US" sz="1800" dirty="0">
-              <a:solidFill>
-                <a:srgbClr val="000000"/>
-              </a:solidFill>
-            </a:endParaRPr>
-          </a:p>
-          <a:p>
-            <a:pPr algn="ctr"/>
-            <a:r>
-              <a:rPr lang="en-US" sz="1800" b="1" dirty="0" smtClean="0">
-                <a:solidFill>
-                  <a:srgbClr val="000000"/>
-                </a:solidFill>
-              </a:rPr>
-              <a:t>IP namespace 1</a:t>
-            </a:r>
-            <a:endParaRPr lang="en-US" sz="1800" b="1" dirty="0">
-              <a:solidFill>
-                <a:srgbClr val="000000"/>
-              </a:solidFill>
-            </a:endParaRPr>
-          </a:p>
-        </p:txBody>
-      </p:sp>
     </p:spTree>
     <p:extLst>
       <p:ext uri="{BB962C8B-B14F-4D97-AF65-F5344CB8AC3E}">

</xml_diff>